<commit_message>
make some changes on ppts
</commit_message>
<xml_diff>
--- a/training_draft/git_introduction.pptx
+++ b/training_draft/git_introduction.pptx
@@ -540,7 +540,7 @@
           <a:p>
             <a:fld id="{83284890-85D2-4D7B-8EF5-15A9C1DB8F42}" type="datetimeFigureOut">
               <a:rPr lang="en-US" smtClean="0"/>
-              <a:t>4/28/2017</a:t>
+              <a:t>10/7/2017</a:t>
             </a:fld>
             <a:endParaRPr lang="en-US" dirty="0"/>
           </a:p>
@@ -725,7 +725,7 @@
           <a:p>
             <a:fld id="{87157CC2-0FC8-4686-B024-99790E0F5162}" type="datetimeFigureOut">
               <a:rPr lang="en-US" smtClean="0"/>
-              <a:t>4/28/2017</a:t>
+              <a:t>10/7/2017</a:t>
             </a:fld>
             <a:endParaRPr lang="en-US" dirty="0"/>
           </a:p>
@@ -909,7 +909,7 @@
           <a:p>
             <a:fld id="{F6764DA5-CD3D-4590-A511-FCD3BC7A793E}" type="datetimeFigureOut">
               <a:rPr lang="en-US" smtClean="0"/>
-              <a:t>4/28/2017</a:t>
+              <a:t>10/7/2017</a:t>
             </a:fld>
             <a:endParaRPr lang="en-US" dirty="0"/>
           </a:p>
@@ -1079,7 +1079,7 @@
           <a:p>
             <a:fld id="{82F5661D-6934-4B32-B92C-470368BF1EC6}" type="datetimeFigureOut">
               <a:rPr lang="en-US" smtClean="0"/>
-              <a:t>4/28/2017</a:t>
+              <a:t>10/7/2017</a:t>
             </a:fld>
             <a:endParaRPr lang="en-US" dirty="0"/>
           </a:p>
@@ -1404,7 +1404,7 @@
           <a:p>
             <a:fld id="{C6F822A4-8DA6-4447-9B1F-C5DB58435268}" type="datetimeFigureOut">
               <a:rPr lang="en-US" smtClean="0"/>
-              <a:t>4/28/2017</a:t>
+              <a:t>10/7/2017</a:t>
             </a:fld>
             <a:endParaRPr lang="en-US" dirty="0"/>
           </a:p>
@@ -1803,7 +1803,7 @@
           <a:p>
             <a:fld id="{E548D31E-DCDA-41A7-9C67-C4B11B94D21D}" type="datetimeFigureOut">
               <a:rPr lang="en-US" smtClean="0"/>
-              <a:t>4/28/2017</a:t>
+              <a:t>10/7/2017</a:t>
             </a:fld>
             <a:endParaRPr lang="en-US" dirty="0"/>
           </a:p>
@@ -2237,7 +2237,7 @@
           <a:p>
             <a:fld id="{9B3762C0-B258-48F1-ADE6-176B4174CCDD}" type="datetimeFigureOut">
               <a:rPr lang="en-US" smtClean="0"/>
-              <a:t>4/28/2017</a:t>
+              <a:t>10/7/2017</a:t>
             </a:fld>
             <a:endParaRPr lang="en-US" dirty="0"/>
           </a:p>
@@ -2365,7 +2365,7 @@
           <a:p>
             <a:fld id="{677919A6-33EB-49BD-A62F-1FA56B9F9712}" type="datetimeFigureOut">
               <a:rPr lang="en-US" smtClean="0"/>
-              <a:t>4/28/2017</a:t>
+              <a:t>10/7/2017</a:t>
             </a:fld>
             <a:endParaRPr lang="en-US" dirty="0"/>
           </a:p>
@@ -2470,7 +2470,7 @@
           <a:p>
             <a:fld id="{CA4E7D1B-D673-4CF6-8672-009D42ABD2A0}" type="datetimeFigureOut">
               <a:rPr lang="en-US" smtClean="0"/>
-              <a:t>4/28/2017</a:t>
+              <a:t>10/7/2017</a:t>
             </a:fld>
             <a:endParaRPr lang="en-US" dirty="0"/>
           </a:p>
@@ -2911,7 +2911,7 @@
           <a:p>
             <a:fld id="{DA16AA21-1863-4931-97CB-99D0A168701B}" type="datetimeFigureOut">
               <a:rPr lang="en-US" smtClean="0"/>
-              <a:t>4/28/2017</a:t>
+              <a:t>10/7/2017</a:t>
             </a:fld>
             <a:endParaRPr lang="en-US" dirty="0"/>
           </a:p>
@@ -3338,7 +3338,7 @@
           <a:p>
             <a:fld id="{3772C379-9A7C-4C87-A116-CBE9F58B04C5}" type="datetimeFigureOut">
               <a:rPr lang="en-US" smtClean="0"/>
-              <a:t>4/28/2017</a:t>
+              <a:t>10/7/2017</a:t>
             </a:fld>
             <a:endParaRPr lang="en-US" dirty="0"/>
           </a:p>
@@ -3623,7 +3623,7 @@
           <a:p>
             <a:fld id="{8664C608-40B1-4030-A28D-5B74BC98ADCE}" type="datetimeFigureOut">
               <a:rPr lang="en-US" smtClean="0"/>
-              <a:t>4/28/2017</a:t>
+              <a:t>10/7/2017</a:t>
             </a:fld>
             <a:endParaRPr lang="en-US" dirty="0"/>
           </a:p>
@@ -4150,12 +4150,20 @@
             <p:ph type="subTitle" idx="1"/>
           </p:nvPr>
         </p:nvSpPr>
-        <p:spPr/>
+        <p:spPr>
+          <a:xfrm>
+            <a:off x="802386" y="5099900"/>
+            <a:ext cx="5918454" cy="359067"/>
+          </a:xfrm>
+        </p:spPr>
         <p:txBody>
           <a:bodyPr/>
           <a:lstStyle/>
           <a:p>
-            <a:endParaRPr lang="en-US" dirty="0"/>
+            <a:r>
+              <a:rPr lang="en-US" dirty="0"/>
+              <a:t>Haijun Deng</a:t>
+            </a:r>
           </a:p>
         </p:txBody>
       </p:sp>

</xml_diff>

<commit_message>
update a little on git ppt
</commit_message>
<xml_diff>
--- a/training_draft/git_introduction.pptx
+++ b/training_draft/git_introduction.pptx
@@ -2,7 +2,7 @@
 <file path=ppt/presentation.xml><?xml version="1.0" encoding="utf-8"?>
 <p:presentation xmlns:a="http://schemas.openxmlformats.org/drawingml/2006/main" xmlns:r="http://schemas.openxmlformats.org/officeDocument/2006/relationships" xmlns:p="http://schemas.openxmlformats.org/presentationml/2006/main" autoCompressPictures="0">
   <p:sldMasterIdLst>
-    <p:sldMasterId id="2147483852" r:id="rId1"/>
+    <p:sldMasterId id="2147483864" r:id="rId1"/>
   </p:sldMasterIdLst>
   <p:sldIdLst>
     <p:sldId id="256" r:id="rId2"/>
@@ -26,7 +26,7 @@
     <p:sldId id="262" r:id="rId20"/>
     <p:sldId id="273" r:id="rId21"/>
   </p:sldIdLst>
-  <p:sldSz cx="9144000" cy="6858000" type="screen4x3"/>
+  <p:sldSz cx="12192000" cy="6858000"/>
   <p:notesSz cx="6858000" cy="9144000"/>
   <p:defaultTextStyle>
     <a:defPPr>
@@ -160,15 +160,15 @@
         </p:nvSpPr>
         <p:spPr>
           <a:xfrm>
-            <a:off x="685800" y="1346947"/>
-            <a:ext cx="7772400" cy="80683"/>
+            <a:off x="920834" y="1346946"/>
+            <a:ext cx="10222992" cy="80683"/>
           </a:xfrm>
           <a:prstGeom prst="rect">
             <a:avLst/>
           </a:prstGeom>
           <a:blipFill dpi="0" rotWithShape="1">
             <a:blip r:embed="rId2">
-              <a:alphaModFix amt="80000"/>
+              <a:alphaModFix amt="85000"/>
               <a:lum bright="70000" contrast="-70000"/>
               <a:extLst>
                 <a:ext uri="{BEBA8EAE-BF5A-486C-A8C5-ECC9F3942E4B}">
@@ -217,15 +217,15 @@
         </p:nvSpPr>
         <p:spPr>
           <a:xfrm>
-            <a:off x="685800" y="4282763"/>
-            <a:ext cx="7772400" cy="80683"/>
+            <a:off x="920834" y="4299696"/>
+            <a:ext cx="10222992" cy="80683"/>
           </a:xfrm>
           <a:prstGeom prst="rect">
             <a:avLst/>
           </a:prstGeom>
           <a:blipFill dpi="0" rotWithShape="1">
             <a:blip r:embed="rId2">
-              <a:alphaModFix amt="80000"/>
+              <a:alphaModFix amt="85000"/>
               <a:lum bright="70000" contrast="-70000"/>
               <a:extLst>
                 <a:ext uri="{BEBA8EAE-BF5A-486C-A8C5-ECC9F3942E4B}">
@@ -274,15 +274,15 @@
         </p:nvSpPr>
         <p:spPr>
           <a:xfrm>
-            <a:off x="685800" y="1484779"/>
-            <a:ext cx="7772400" cy="2743200"/>
+            <a:off x="920834" y="1484779"/>
+            <a:ext cx="10222992" cy="2743200"/>
           </a:xfrm>
           <a:prstGeom prst="rect">
             <a:avLst/>
           </a:prstGeom>
           <a:blipFill dpi="0" rotWithShape="1">
             <a:blip r:embed="rId2">
-              <a:alphaModFix amt="80000"/>
+              <a:alphaModFix amt="85000"/>
               <a:lum bright="70000" contrast="-70000"/>
               <a:extLst>
                 <a:ext uri="{BEBA8EAE-BF5A-486C-A8C5-ECC9F3942E4B}">
@@ -326,15 +326,13 @@
       <p:grpSp>
         <p:nvGrpSpPr>
           <p:cNvPr id="10" name="Group 9"/>
-          <p:cNvGrpSpPr>
-            <a:grpSpLocks noChangeAspect="1"/>
-          </p:cNvGrpSpPr>
+          <p:cNvGrpSpPr/>
           <p:nvPr/>
         </p:nvGrpSpPr>
         <p:grpSpPr>
           <a:xfrm>
-            <a:off x="7234780" y="4107023"/>
-            <a:ext cx="914400" cy="914400"/>
+            <a:off x="9649215" y="4068923"/>
+            <a:ext cx="1080904" cy="1080902"/>
             <a:chOff x="9685338" y="4460675"/>
             <a:chExt cx="1080904" cy="1080902"/>
           </a:xfrm>
@@ -421,8 +419,8 @@
         </p:nvSpPr>
         <p:spPr>
           <a:xfrm>
-            <a:off x="788670" y="1432223"/>
-            <a:ext cx="7593330" cy="3035808"/>
+            <a:off x="1051560" y="1432223"/>
+            <a:ext cx="9966960" cy="3035808"/>
           </a:xfrm>
         </p:spPr>
         <p:txBody>
@@ -434,7 +432,7 @@
               <a:lnSpc>
                 <a:spcPct val="80000"/>
               </a:lnSpc>
-              <a:defRPr sz="6400" b="0" cap="all" baseline="0">
+              <a:defRPr sz="9600" cap="all" baseline="0">
                 <a:blipFill dpi="0" rotWithShape="1">
                   <a:blip r:embed="rId4"/>
                   <a:srcRect/>
@@ -464,8 +462,8 @@
         </p:nvSpPr>
         <p:spPr>
           <a:xfrm>
-            <a:off x="802386" y="4389120"/>
-            <a:ext cx="5918454" cy="1069848"/>
+            <a:off x="1069848" y="4389120"/>
+            <a:ext cx="7891272" cy="1069848"/>
           </a:xfrm>
         </p:spPr>
         <p:txBody>
@@ -475,7 +473,7 @@
           <a:lstStyle>
             <a:lvl1pPr marL="0" indent="0" algn="l">
               <a:buNone/>
-              <a:defRPr sz="1800" b="0">
+              <a:defRPr sz="2200">
                 <a:solidFill>
                   <a:schemeClr val="tx1"/>
                 </a:solidFill>
@@ -483,35 +481,35 @@
             </a:lvl1pPr>
             <a:lvl2pPr marL="457200" indent="0" algn="ctr">
               <a:buNone/>
-              <a:defRPr sz="1800"/>
+              <a:defRPr sz="2200"/>
             </a:lvl2pPr>
             <a:lvl3pPr marL="914400" indent="0" algn="ctr">
               <a:buNone/>
-              <a:defRPr sz="1800"/>
+              <a:defRPr sz="2200"/>
             </a:lvl3pPr>
             <a:lvl4pPr marL="1371600" indent="0" algn="ctr">
               <a:buNone/>
-              <a:defRPr sz="1800"/>
+              <a:defRPr sz="2000"/>
             </a:lvl4pPr>
             <a:lvl5pPr marL="1828800" indent="0" algn="ctr">
               <a:buNone/>
-              <a:defRPr sz="1800"/>
+              <a:defRPr sz="2000"/>
             </a:lvl5pPr>
             <a:lvl6pPr marL="2286000" indent="0" algn="ctr">
               <a:buNone/>
-              <a:defRPr sz="1800"/>
+              <a:defRPr sz="2000"/>
             </a:lvl6pPr>
             <a:lvl7pPr marL="2743200" indent="0" algn="ctr">
               <a:buNone/>
-              <a:defRPr sz="1800"/>
+              <a:defRPr sz="2000"/>
             </a:lvl7pPr>
             <a:lvl8pPr marL="3200400" indent="0" algn="ctr">
               <a:buNone/>
-              <a:defRPr sz="1800"/>
+              <a:defRPr sz="2000"/>
             </a:lvl8pPr>
             <a:lvl9pPr marL="3657600" indent="0" algn="ctr">
               <a:buNone/>
-              <a:defRPr sz="1800"/>
+              <a:defRPr sz="2000"/>
             </a:lvl9pPr>
           </a:lstStyle>
           <a:p>
@@ -540,7 +538,7 @@
           <a:p>
             <a:fld id="{83284890-85D2-4D7B-8EF5-15A9C1DB8F42}" type="datetimeFigureOut">
               <a:rPr lang="en-US" smtClean="0"/>
-              <a:t>10/7/2017</a:t>
+              <a:t>2/1/2018</a:t>
             </a:fld>
             <a:endParaRPr lang="en-US" dirty="0"/>
           </a:p>
@@ -554,43 +552,38 @@
           </p:cNvSpPr>
           <p:nvPr>
             <p:ph type="ftr" sz="quarter" idx="11"/>
+          </p:nvPr>
+        </p:nvSpPr>
+        <p:spPr/>
+        <p:txBody>
+          <a:bodyPr/>
+          <a:lstStyle/>
+          <a:p>
+            <a:endParaRPr lang="en-US" dirty="0"/>
+          </a:p>
+        </p:txBody>
+      </p:sp>
+      <p:sp>
+        <p:nvSpPr>
+          <p:cNvPr id="6" name="Slide Number Placeholder 5"/>
+          <p:cNvSpPr>
+            <a:spLocks noGrp="1"/>
+          </p:cNvSpPr>
+          <p:nvPr>
+            <p:ph type="sldNum" sz="quarter" idx="12"/>
           </p:nvPr>
         </p:nvSpPr>
         <p:spPr>
           <a:xfrm>
-            <a:off x="812805" y="6272785"/>
-            <a:ext cx="4745736" cy="365125"/>
-          </a:xfrm>
-        </p:spPr>
-        <p:txBody>
-          <a:bodyPr/>
-          <a:lstStyle/>
-          <a:p>
-            <a:endParaRPr lang="en-US" dirty="0"/>
-          </a:p>
-        </p:txBody>
-      </p:sp>
-      <p:sp>
-        <p:nvSpPr>
-          <p:cNvPr id="6" name="Slide Number Placeholder 5"/>
-          <p:cNvSpPr>
-            <a:spLocks noGrp="1"/>
-          </p:cNvSpPr>
-          <p:nvPr>
-            <p:ph type="sldNum" sz="quarter" idx="12"/>
-          </p:nvPr>
-        </p:nvSpPr>
-        <p:spPr>
-          <a:xfrm>
-            <a:off x="7244280" y="4227195"/>
-            <a:ext cx="895401" cy="640080"/>
+            <a:off x="9592733" y="4289334"/>
+            <a:ext cx="1193868" cy="640080"/>
           </a:xfrm>
         </p:spPr>
         <p:txBody>
           <a:bodyPr/>
           <a:lstStyle>
             <a:lvl1pPr>
-              <a:defRPr sz="2800" b="1"/>
+              <a:defRPr sz="2800"/>
             </a:lvl1pPr>
           </a:lstStyle>
           <a:p>
@@ -606,7 +599,7 @@
     </p:spTree>
     <p:extLst>
       <p:ext uri="{BB962C8B-B14F-4D97-AF65-F5344CB8AC3E}">
-        <p14:creationId xmlns:p14="http://schemas.microsoft.com/office/powerpoint/2010/main" val="3352716659"/>
+        <p14:creationId xmlns:p14="http://schemas.microsoft.com/office/powerpoint/2010/main" val="1029453423"/>
       </p:ext>
     </p:extLst>
   </p:cSld>
@@ -710,7 +703,7 @@
       </p:sp>
       <p:sp>
         <p:nvSpPr>
-          <p:cNvPr id="7" name="Date Placeholder 6"/>
+          <p:cNvPr id="4" name="Date Placeholder 3"/>
           <p:cNvSpPr>
             <a:spLocks noGrp="1"/>
           </p:cNvSpPr>
@@ -725,7 +718,7 @@
           <a:p>
             <a:fld id="{87157CC2-0FC8-4686-B024-99790E0F5162}" type="datetimeFigureOut">
               <a:rPr lang="en-US" smtClean="0"/>
-              <a:t>10/7/2017</a:t>
+              <a:t>2/1/2018</a:t>
             </a:fld>
             <a:endParaRPr lang="en-US" dirty="0"/>
           </a:p>
@@ -733,7 +726,7 @@
       </p:sp>
       <p:sp>
         <p:nvSpPr>
-          <p:cNvPr id="8" name="Footer Placeholder 7"/>
+          <p:cNvPr id="5" name="Footer Placeholder 4"/>
           <p:cNvSpPr>
             <a:spLocks noGrp="1"/>
           </p:cNvSpPr>
@@ -752,7 +745,7 @@
       </p:sp>
       <p:sp>
         <p:nvSpPr>
-          <p:cNvPr id="9" name="Slide Number Placeholder 8"/>
+          <p:cNvPr id="6" name="Slide Number Placeholder 5"/>
           <p:cNvSpPr>
             <a:spLocks noGrp="1"/>
           </p:cNvSpPr>
@@ -776,7 +769,7 @@
     </p:spTree>
     <p:extLst>
       <p:ext uri="{BB962C8B-B14F-4D97-AF65-F5344CB8AC3E}">
-        <p14:creationId xmlns:p14="http://schemas.microsoft.com/office/powerpoint/2010/main" val="2096781959"/>
+        <p14:creationId xmlns:p14="http://schemas.microsoft.com/office/powerpoint/2010/main" val="2434730915"/>
       </p:ext>
     </p:extLst>
   </p:cSld>
@@ -815,17 +808,13 @@
         </p:nvSpPr>
         <p:spPr>
           <a:xfrm>
-            <a:off x="6543675" y="533400"/>
-            <a:ext cx="1914525" cy="5638800"/>
+            <a:off x="8724900" y="533400"/>
+            <a:ext cx="2552700" cy="5638800"/>
           </a:xfrm>
         </p:spPr>
         <p:txBody>
           <a:bodyPr vert="eaVert"/>
-          <a:lstStyle>
-            <a:lvl1pPr>
-              <a:defRPr b="0"/>
-            </a:lvl1pPr>
-          </a:lstStyle>
+          <a:lstStyle/>
           <a:p>
             <a:r>
               <a:rPr lang="en-US"/>
@@ -847,8 +836,8 @@
         </p:nvSpPr>
         <p:spPr>
           <a:xfrm>
-            <a:off x="800100" y="533400"/>
-            <a:ext cx="5629275" cy="5638800"/>
+            <a:off x="1066800" y="533400"/>
+            <a:ext cx="7505700" cy="5638800"/>
           </a:xfrm>
         </p:spPr>
         <p:txBody>
@@ -894,7 +883,7 @@
       </p:sp>
       <p:sp>
         <p:nvSpPr>
-          <p:cNvPr id="7" name="Date Placeholder 6"/>
+          <p:cNvPr id="4" name="Date Placeholder 3"/>
           <p:cNvSpPr>
             <a:spLocks noGrp="1"/>
           </p:cNvSpPr>
@@ -909,7 +898,7 @@
           <a:p>
             <a:fld id="{F6764DA5-CD3D-4590-A511-FCD3BC7A793E}" type="datetimeFigureOut">
               <a:rPr lang="en-US" smtClean="0"/>
-              <a:t>10/7/2017</a:t>
+              <a:t>2/1/2018</a:t>
             </a:fld>
             <a:endParaRPr lang="en-US" dirty="0"/>
           </a:p>
@@ -917,7 +906,7 @@
       </p:sp>
       <p:sp>
         <p:nvSpPr>
-          <p:cNvPr id="8" name="Footer Placeholder 7"/>
+          <p:cNvPr id="5" name="Footer Placeholder 4"/>
           <p:cNvSpPr>
             <a:spLocks noGrp="1"/>
           </p:cNvSpPr>
@@ -936,7 +925,7 @@
       </p:sp>
       <p:sp>
         <p:nvSpPr>
-          <p:cNvPr id="9" name="Slide Number Placeholder 8"/>
+          <p:cNvPr id="6" name="Slide Number Placeholder 5"/>
           <p:cNvSpPr>
             <a:spLocks noGrp="1"/>
           </p:cNvSpPr>
@@ -960,7 +949,7 @@
     </p:spTree>
     <p:extLst>
       <p:ext uri="{BB962C8B-B14F-4D97-AF65-F5344CB8AC3E}">
-        <p14:creationId xmlns:p14="http://schemas.microsoft.com/office/powerpoint/2010/main" val="2255161495"/>
+        <p14:creationId xmlns:p14="http://schemas.microsoft.com/office/powerpoint/2010/main" val="3690731296"/>
       </p:ext>
     </p:extLst>
   </p:cSld>
@@ -1064,7 +1053,7 @@
       </p:sp>
       <p:sp>
         <p:nvSpPr>
-          <p:cNvPr id="7" name="Date Placeholder 6"/>
+          <p:cNvPr id="4" name="Date Placeholder 3"/>
           <p:cNvSpPr>
             <a:spLocks noGrp="1"/>
           </p:cNvSpPr>
@@ -1079,7 +1068,7 @@
           <a:p>
             <a:fld id="{82F5661D-6934-4B32-B92C-470368BF1EC6}" type="datetimeFigureOut">
               <a:rPr lang="en-US" smtClean="0"/>
-              <a:t>10/7/2017</a:t>
+              <a:t>2/1/2018</a:t>
             </a:fld>
             <a:endParaRPr lang="en-US" dirty="0"/>
           </a:p>
@@ -1087,7 +1076,7 @@
       </p:sp>
       <p:sp>
         <p:nvSpPr>
-          <p:cNvPr id="8" name="Footer Placeholder 7"/>
+          <p:cNvPr id="5" name="Footer Placeholder 4"/>
           <p:cNvSpPr>
             <a:spLocks noGrp="1"/>
           </p:cNvSpPr>
@@ -1106,7 +1095,7 @@
       </p:sp>
       <p:sp>
         <p:nvSpPr>
-          <p:cNvPr id="9" name="Slide Number Placeholder 8"/>
+          <p:cNvPr id="6" name="Slide Number Placeholder 5"/>
           <p:cNvSpPr>
             <a:spLocks noGrp="1"/>
           </p:cNvSpPr>
@@ -1130,7 +1119,7 @@
     </p:spTree>
     <p:extLst>
       <p:ext uri="{BB962C8B-B14F-4D97-AF65-F5344CB8AC3E}">
-        <p14:creationId xmlns:p14="http://schemas.microsoft.com/office/powerpoint/2010/main" val="2004638242"/>
+        <p14:creationId xmlns:p14="http://schemas.microsoft.com/office/powerpoint/2010/main" val="187575826"/>
       </p:ext>
     </p:extLst>
   </p:cSld>
@@ -1166,14 +1155,14 @@
         <p:spPr>
           <a:xfrm>
             <a:off x="0" y="4917989"/>
-            <a:ext cx="9144000" cy="1940010"/>
+            <a:ext cx="12192000" cy="1940010"/>
           </a:xfrm>
           <a:prstGeom prst="rect">
             <a:avLst/>
           </a:prstGeom>
           <a:blipFill dpi="0" rotWithShape="1">
             <a:blip r:embed="rId2">
-              <a:alphaModFix amt="80000"/>
+              <a:alphaModFix amt="85000"/>
               <a:lum bright="70000" contrast="-70000"/>
               <a:extLst>
                 <a:ext uri="{BEBA8EAE-BF5A-486C-A8C5-ECC9F3942E4B}">
@@ -1226,8 +1215,8 @@
         </p:nvSpPr>
         <p:spPr>
           <a:xfrm>
-            <a:off x="1625346" y="1225296"/>
-            <a:ext cx="6960870" cy="3520440"/>
+            <a:off x="2167128" y="1225296"/>
+            <a:ext cx="9281160" cy="3520440"/>
           </a:xfrm>
         </p:spPr>
         <p:txBody>
@@ -1239,7 +1228,7 @@
               <a:lnSpc>
                 <a:spcPct val="80000"/>
               </a:lnSpc>
-              <a:defRPr sz="6400" b="0"/>
+              <a:defRPr sz="8000" b="0"/>
             </a:lvl1pPr>
           </a:lstStyle>
           <a:p>
@@ -1263,8 +1252,8 @@
         </p:nvSpPr>
         <p:spPr>
           <a:xfrm>
-            <a:off x="1624330" y="5020056"/>
-            <a:ext cx="6789420" cy="1066800"/>
+            <a:off x="2165774" y="5020056"/>
+            <a:ext cx="9052560" cy="1066800"/>
           </a:xfrm>
         </p:spPr>
         <p:txBody>
@@ -1274,11 +1263,9 @@
           <a:lstStyle>
             <a:lvl1pPr marL="0" indent="0">
               <a:buNone/>
-              <a:defRPr sz="1800" b="0">
+              <a:defRPr sz="2000">
                 <a:solidFill>
-                  <a:schemeClr val="accent1">
-                    <a:lumMod val="50000"/>
-                  </a:schemeClr>
+                  <a:schemeClr val="tx1"/>
                 </a:solidFill>
               </a:defRPr>
             </a:lvl1pPr>
@@ -1384,27 +1371,17 @@
         </p:nvSpPr>
         <p:spPr>
           <a:xfrm>
-            <a:off x="6445251" y="6272785"/>
-            <a:ext cx="1983232" cy="365125"/>
+            <a:off x="8593667" y="6272784"/>
+            <a:ext cx="2644309" cy="365125"/>
           </a:xfrm>
         </p:spPr>
         <p:txBody>
           <a:bodyPr/>
-          <a:lstStyle>
-            <a:lvl1pPr>
-              <a:defRPr>
-                <a:solidFill>
-                  <a:schemeClr val="accent1">
-                    <a:lumMod val="50000"/>
-                  </a:schemeClr>
-                </a:solidFill>
-              </a:defRPr>
-            </a:lvl1pPr>
-          </a:lstStyle>
+          <a:lstStyle/>
           <a:p>
             <a:fld id="{C6F822A4-8DA6-4447-9B1F-C5DB58435268}" type="datetimeFigureOut">
               <a:rPr lang="en-US" smtClean="0"/>
-              <a:t>10/7/2017</a:t>
+              <a:t>2/1/2018</a:t>
             </a:fld>
             <a:endParaRPr lang="en-US" dirty="0"/>
           </a:p>
@@ -1422,23 +1399,13 @@
         </p:nvSpPr>
         <p:spPr>
           <a:xfrm>
-            <a:off x="1636099" y="6272784"/>
-            <a:ext cx="4745736" cy="365125"/>
+            <a:off x="2182708" y="6272784"/>
+            <a:ext cx="6327648" cy="365125"/>
           </a:xfrm>
         </p:spPr>
         <p:txBody>
           <a:bodyPr/>
-          <a:lstStyle>
-            <a:lvl1pPr>
-              <a:defRPr>
-                <a:solidFill>
-                  <a:schemeClr val="accent1">
-                    <a:lumMod val="50000"/>
-                  </a:schemeClr>
-                </a:solidFill>
-              </a:defRPr>
-            </a:lvl1pPr>
-          </a:lstStyle>
+          <a:lstStyle/>
           <a:p>
             <a:endParaRPr lang="en-US" dirty="0"/>
           </a:p>
@@ -1447,15 +1414,13 @@
       <p:grpSp>
         <p:nvGrpSpPr>
           <p:cNvPr id="8" name="Group 7"/>
-          <p:cNvGrpSpPr>
-            <a:grpSpLocks noChangeAspect="1"/>
-          </p:cNvGrpSpPr>
+          <p:cNvGrpSpPr/>
           <p:nvPr/>
         </p:nvGrpSpPr>
         <p:grpSpPr>
           <a:xfrm>
-            <a:off x="633862" y="2430623"/>
-            <a:ext cx="914400" cy="914400"/>
+            <a:off x="897399" y="2325848"/>
+            <a:ext cx="1080904" cy="1080902"/>
             <a:chOff x="9685338" y="4460675"/>
             <a:chExt cx="1080904" cy="1080902"/>
           </a:xfrm>
@@ -1542,8 +1507,8 @@
         </p:nvSpPr>
         <p:spPr>
           <a:xfrm>
-            <a:off x="645450" y="2508607"/>
-            <a:ext cx="891224" cy="720332"/>
+            <a:off x="843702" y="2506133"/>
+            <a:ext cx="1188298" cy="720332"/>
           </a:xfrm>
         </p:spPr>
         <p:txBody>
@@ -1566,7 +1531,7 @@
     </p:spTree>
     <p:extLst>
       <p:ext uri="{BB962C8B-B14F-4D97-AF65-F5344CB8AC3E}">
-        <p14:creationId xmlns:p14="http://schemas.microsoft.com/office/powerpoint/2010/main" val="1437334881"/>
+        <p14:creationId xmlns:p14="http://schemas.microsoft.com/office/powerpoint/2010/main" val="4075843477"/>
       </p:ext>
     </p:extLst>
   </p:cSld>
@@ -1628,8 +1593,8 @@
         </p:nvSpPr>
         <p:spPr>
           <a:xfrm>
-            <a:off x="685800" y="2194560"/>
-            <a:ext cx="3657600" cy="3977640"/>
+            <a:off x="1069848" y="2194560"/>
+            <a:ext cx="4754880" cy="3977640"/>
           </a:xfrm>
         </p:spPr>
         <p:txBody>
@@ -1713,8 +1678,8 @@
         </p:nvSpPr>
         <p:spPr>
           <a:xfrm>
-            <a:off x="4792218" y="2194560"/>
-            <a:ext cx="3657600" cy="3977640"/>
+            <a:off x="6364224" y="2194560"/>
+            <a:ext cx="4754880" cy="3977640"/>
           </a:xfrm>
         </p:spPr>
         <p:txBody>
@@ -1803,7 +1768,7 @@
           <a:p>
             <a:fld id="{E548D31E-DCDA-41A7-9C67-C4B11B94D21D}" type="datetimeFigureOut">
               <a:rPr lang="en-US" smtClean="0"/>
-              <a:t>10/7/2017</a:t>
+              <a:t>2/1/2018</a:t>
             </a:fld>
             <a:endParaRPr lang="en-US" dirty="0"/>
           </a:p>
@@ -1854,7 +1819,7 @@
     </p:spTree>
     <p:extLst>
       <p:ext uri="{BB962C8B-B14F-4D97-AF65-F5344CB8AC3E}">
-        <p14:creationId xmlns:p14="http://schemas.microsoft.com/office/powerpoint/2010/main" val="1598721154"/>
+        <p14:creationId xmlns:p14="http://schemas.microsoft.com/office/powerpoint/2010/main" val="733083718"/>
       </p:ext>
     </p:extLst>
   </p:cSld>
@@ -1916,8 +1881,8 @@
         </p:nvSpPr>
         <p:spPr>
           <a:xfrm>
-            <a:off x="685800" y="2048256"/>
-            <a:ext cx="3657600" cy="640080"/>
+            <a:off x="1066800" y="2048256"/>
+            <a:ext cx="4754880" cy="640080"/>
           </a:xfrm>
         </p:spPr>
         <p:txBody>
@@ -1989,8 +1954,8 @@
         </p:nvSpPr>
         <p:spPr>
           <a:xfrm>
-            <a:off x="685800" y="2743200"/>
-            <a:ext cx="3657600" cy="3291840"/>
+            <a:off x="1069848" y="2743200"/>
+            <a:ext cx="4754880" cy="3291840"/>
           </a:xfrm>
         </p:spPr>
         <p:txBody>
@@ -2074,8 +2039,8 @@
         </p:nvSpPr>
         <p:spPr>
           <a:xfrm>
-            <a:off x="4820793" y="2048256"/>
-            <a:ext cx="3657600" cy="640080"/>
+            <a:off x="6364224" y="2048256"/>
+            <a:ext cx="4754880" cy="640080"/>
           </a:xfrm>
         </p:spPr>
         <p:txBody>
@@ -2147,8 +2112,8 @@
         </p:nvSpPr>
         <p:spPr>
           <a:xfrm>
-            <a:off x="4820793" y="2743200"/>
-            <a:ext cx="3657600" cy="3291840"/>
+            <a:off x="6364224" y="2743200"/>
+            <a:ext cx="4754880" cy="3291840"/>
           </a:xfrm>
         </p:spPr>
         <p:txBody>
@@ -2237,7 +2202,7 @@
           <a:p>
             <a:fld id="{9B3762C0-B258-48F1-ADE6-176B4174CCDD}" type="datetimeFigureOut">
               <a:rPr lang="en-US" smtClean="0"/>
-              <a:t>10/7/2017</a:t>
+              <a:t>2/1/2018</a:t>
             </a:fld>
             <a:endParaRPr lang="en-US" dirty="0"/>
           </a:p>
@@ -2288,7 +2253,7 @@
     </p:spTree>
     <p:extLst>
       <p:ext uri="{BB962C8B-B14F-4D97-AF65-F5344CB8AC3E}">
-        <p14:creationId xmlns:p14="http://schemas.microsoft.com/office/powerpoint/2010/main" val="2605488179"/>
+        <p14:creationId xmlns:p14="http://schemas.microsoft.com/office/powerpoint/2010/main" val="3314578632"/>
       </p:ext>
     </p:extLst>
   </p:cSld>
@@ -2351,21 +2316,11 @@
         <p:spPr/>
         <p:txBody>
           <a:bodyPr/>
-          <a:lstStyle>
-            <a:lvl1pPr>
-              <a:defRPr>
-                <a:solidFill>
-                  <a:schemeClr val="accent1">
-                    <a:lumMod val="50000"/>
-                  </a:schemeClr>
-                </a:solidFill>
-              </a:defRPr>
-            </a:lvl1pPr>
-          </a:lstStyle>
+          <a:lstStyle/>
           <a:p>
             <a:fld id="{677919A6-33EB-49BD-A62F-1FA56B9F9712}" type="datetimeFigureOut">
               <a:rPr lang="en-US" smtClean="0"/>
-              <a:t>10/7/2017</a:t>
+              <a:t>2/1/2018</a:t>
             </a:fld>
             <a:endParaRPr lang="en-US" dirty="0"/>
           </a:p>
@@ -2384,17 +2339,7 @@
         <p:spPr/>
         <p:txBody>
           <a:bodyPr/>
-          <a:lstStyle>
-            <a:lvl1pPr>
-              <a:defRPr>
-                <a:solidFill>
-                  <a:schemeClr val="accent1">
-                    <a:lumMod val="50000"/>
-                  </a:schemeClr>
-                </a:solidFill>
-              </a:defRPr>
-            </a:lvl1pPr>
-          </a:lstStyle>
+          <a:lstStyle/>
           <a:p>
             <a:endParaRPr lang="en-US" dirty="0"/>
           </a:p>
@@ -2426,7 +2371,7 @@
     </p:spTree>
     <p:extLst>
       <p:ext uri="{BB962C8B-B14F-4D97-AF65-F5344CB8AC3E}">
-        <p14:creationId xmlns:p14="http://schemas.microsoft.com/office/powerpoint/2010/main" val="3753203300"/>
+        <p14:creationId xmlns:p14="http://schemas.microsoft.com/office/powerpoint/2010/main" val="3027318834"/>
       </p:ext>
     </p:extLst>
   </p:cSld>
@@ -2470,7 +2415,7 @@
           <a:p>
             <a:fld id="{CA4E7D1B-D673-4CF6-8672-009D42ABD2A0}" type="datetimeFigureOut">
               <a:rPr lang="en-US" smtClean="0"/>
-              <a:t>10/7/2017</a:t>
+              <a:t>2/1/2018</a:t>
             </a:fld>
             <a:endParaRPr lang="en-US" dirty="0"/>
           </a:p>
@@ -2521,7 +2466,7 @@
     </p:spTree>
     <p:extLst>
       <p:ext uri="{BB962C8B-B14F-4D97-AF65-F5344CB8AC3E}">
-        <p14:creationId xmlns:p14="http://schemas.microsoft.com/office/powerpoint/2010/main" val="629240214"/>
+        <p14:creationId xmlns:p14="http://schemas.microsoft.com/office/powerpoint/2010/main" val="1972203897"/>
       </p:ext>
     </p:extLst>
   </p:cSld>
@@ -2556,8 +2501,8 @@
         </p:nvSpPr>
         <p:spPr>
           <a:xfrm>
-            <a:off x="6227806" y="1"/>
-            <a:ext cx="2916194" cy="6857999"/>
+            <a:off x="8303740" y="0"/>
+            <a:ext cx="3888259" cy="6857999"/>
           </a:xfrm>
           <a:prstGeom prst="rect">
             <a:avLst/>
@@ -2617,8 +2562,8 @@
         </p:nvSpPr>
         <p:spPr>
           <a:xfrm>
-            <a:off x="6412230" y="685800"/>
-            <a:ext cx="2400300" cy="1737360"/>
+            <a:off x="8549640" y="685800"/>
+            <a:ext cx="3200400" cy="1737360"/>
           </a:xfrm>
         </p:spPr>
         <p:txBody>
@@ -2627,7 +2572,7 @@
           </a:bodyPr>
           <a:lstStyle>
             <a:lvl1pPr>
-              <a:defRPr sz="2800" b="0"/>
+              <a:defRPr sz="3200" b="1"/>
             </a:lvl1pPr>
           </a:lstStyle>
           <a:p>
@@ -2651,8 +2596,8 @@
         </p:nvSpPr>
         <p:spPr>
           <a:xfrm>
-            <a:off x="628650" y="685800"/>
-            <a:ext cx="5033772" cy="5020056"/>
+            <a:off x="838200" y="685800"/>
+            <a:ext cx="6711696" cy="5020056"/>
           </a:xfrm>
         </p:spPr>
         <p:txBody>
@@ -2736,8 +2681,8 @@
         </p:nvSpPr>
         <p:spPr>
           <a:xfrm>
-            <a:off x="6412230" y="2423160"/>
-            <a:ext cx="2400300" cy="3291840"/>
+            <a:off x="8549640" y="2423160"/>
+            <a:ext cx="3200400" cy="3291840"/>
           </a:xfrm>
         </p:spPr>
         <p:txBody>
@@ -2753,10 +2698,10 @@
                 <a:spcPts val="1000"/>
               </a:spcBef>
               <a:buNone/>
-              <a:defRPr sz="1350">
+              <a:defRPr sz="1400">
                 <a:solidFill>
                   <a:schemeClr val="accent1">
-                    <a:lumMod val="50000"/>
+                    <a:lumMod val="75000"/>
                   </a:schemeClr>
                 </a:solidFill>
               </a:defRPr>
@@ -2803,32 +2748,74 @@
           </a:p>
         </p:txBody>
       </p:sp>
+      <p:sp>
+        <p:nvSpPr>
+          <p:cNvPr id="5" name="Date Placeholder 4"/>
+          <p:cNvSpPr>
+            <a:spLocks noGrp="1"/>
+          </p:cNvSpPr>
+          <p:nvPr>
+            <p:ph type="dt" sz="half" idx="10"/>
+          </p:nvPr>
+        </p:nvSpPr>
+        <p:spPr/>
+        <p:txBody>
+          <a:bodyPr/>
+          <a:lstStyle/>
+          <a:p>
+            <a:fld id="{DA16AA21-1863-4931-97CB-99D0A168701B}" type="datetimeFigureOut">
+              <a:rPr lang="en-US" smtClean="0"/>
+              <a:t>2/1/2018</a:t>
+            </a:fld>
+            <a:endParaRPr lang="en-US" dirty="0"/>
+          </a:p>
+        </p:txBody>
+      </p:sp>
+      <p:sp>
+        <p:nvSpPr>
+          <p:cNvPr id="6" name="Footer Placeholder 5"/>
+          <p:cNvSpPr>
+            <a:spLocks noGrp="1"/>
+          </p:cNvSpPr>
+          <p:nvPr>
+            <p:ph type="ftr" sz="quarter" idx="11"/>
+          </p:nvPr>
+        </p:nvSpPr>
+        <p:spPr/>
+        <p:txBody>
+          <a:bodyPr/>
+          <a:lstStyle/>
+          <a:p>
+            <a:endParaRPr lang="en-US" dirty="0"/>
+          </a:p>
+        </p:txBody>
+      </p:sp>
       <p:grpSp>
         <p:nvGrpSpPr>
-          <p:cNvPr id="12" name="Group 11"/>
-          <p:cNvGrpSpPr/>
+          <p:cNvPr id="9" name="Group 8"/>
+          <p:cNvGrpSpPr>
+            <a:grpSpLocks noChangeAspect="1"/>
+          </p:cNvGrpSpPr>
           <p:nvPr/>
         </p:nvGrpSpPr>
         <p:grpSpPr>
           <a:xfrm>
-            <a:off x="8522664" y="6255258"/>
-            <a:ext cx="393192" cy="393192"/>
-            <a:chOff x="8532189" y="5068824"/>
-            <a:chExt cx="393192" cy="393192"/>
+            <a:off x="11401725" y="6229681"/>
+            <a:ext cx="457200" cy="457200"/>
+            <a:chOff x="11361456" y="6195813"/>
+            <a:chExt cx="548640" cy="548640"/>
           </a:xfrm>
         </p:grpSpPr>
         <p:sp>
           <p:nvSpPr>
-            <p:cNvPr id="13" name="Oval 12"/>
-            <p:cNvSpPr>
-              <a:spLocks noChangeAspect="1"/>
-            </p:cNvSpPr>
+            <p:cNvPr id="10" name="Oval 9"/>
+            <p:cNvSpPr/>
             <p:nvPr/>
           </p:nvSpPr>
           <p:spPr>
             <a:xfrm>
-              <a:off x="8532189" y="5068824"/>
-              <a:ext cx="393192" cy="393192"/>
+              <a:off x="11361456" y="6195813"/>
+              <a:ext cx="548640" cy="548640"/>
             </a:xfrm>
             <a:prstGeom prst="ellipse">
               <a:avLst/>
@@ -2869,16 +2856,14 @@
         </p:sp>
         <p:sp>
           <p:nvSpPr>
-            <p:cNvPr id="14" name="Oval 13"/>
-            <p:cNvSpPr>
-              <a:spLocks noChangeAspect="1"/>
-            </p:cNvSpPr>
+            <p:cNvPr id="11" name="Oval 10"/>
+            <p:cNvSpPr/>
             <p:nvPr/>
           </p:nvSpPr>
           <p:spPr>
             <a:xfrm>
-              <a:off x="8568766" y="5105400"/>
-              <a:ext cx="320039" cy="320040"/>
+              <a:off x="11396488" y="6230844"/>
+              <a:ext cx="478576" cy="478578"/>
             </a:xfrm>
             <a:prstGeom prst="ellipse">
               <a:avLst/>
@@ -2886,7 +2871,7 @@
             <a:noFill/>
             <a:ln w="12700" cap="flat" cmpd="sng" algn="ctr">
               <a:solidFill>
-                <a:srgbClr val="FFFFFF"/>
+                <a:sysClr val="window" lastClr="FFFFFF"/>
               </a:solidFill>
               <a:prstDash val="solid"/>
             </a:ln>
@@ -2896,49 +2881,7 @@
       </p:grpSp>
       <p:sp>
         <p:nvSpPr>
-          <p:cNvPr id="9" name="Date Placeholder 8"/>
-          <p:cNvSpPr>
-            <a:spLocks noGrp="1"/>
-          </p:cNvSpPr>
-          <p:nvPr>
-            <p:ph type="dt" sz="half" idx="10"/>
-          </p:nvPr>
-        </p:nvSpPr>
-        <p:spPr/>
-        <p:txBody>
-          <a:bodyPr/>
-          <a:lstStyle/>
-          <a:p>
-            <a:fld id="{DA16AA21-1863-4931-97CB-99D0A168701B}" type="datetimeFigureOut">
-              <a:rPr lang="en-US" smtClean="0"/>
-              <a:t>10/7/2017</a:t>
-            </a:fld>
-            <a:endParaRPr lang="en-US" dirty="0"/>
-          </a:p>
-        </p:txBody>
-      </p:sp>
-      <p:sp>
-        <p:nvSpPr>
-          <p:cNvPr id="10" name="Footer Placeholder 9"/>
-          <p:cNvSpPr>
-            <a:spLocks noGrp="1"/>
-          </p:cNvSpPr>
-          <p:nvPr>
-            <p:ph type="ftr" sz="quarter" idx="11"/>
-          </p:nvPr>
-        </p:nvSpPr>
-        <p:spPr/>
-        <p:txBody>
-          <a:bodyPr/>
-          <a:lstStyle/>
-          <a:p>
-            <a:endParaRPr lang="en-US" dirty="0"/>
-          </a:p>
-        </p:txBody>
-      </p:sp>
-      <p:sp>
-        <p:nvSpPr>
-          <p:cNvPr id="11" name="Slide Number Placeholder 10"/>
+          <p:cNvPr id="7" name="Slide Number Placeholder 6"/>
           <p:cNvSpPr>
             <a:spLocks noGrp="1"/>
           </p:cNvSpPr>
@@ -2962,7 +2905,7 @@
     </p:spTree>
     <p:extLst>
       <p:ext uri="{BB962C8B-B14F-4D97-AF65-F5344CB8AC3E}">
-        <p14:creationId xmlns:p14="http://schemas.microsoft.com/office/powerpoint/2010/main" val="1142226271"/>
+        <p14:creationId xmlns:p14="http://schemas.microsoft.com/office/powerpoint/2010/main" val="1711623893"/>
       </p:ext>
     </p:extLst>
   </p:cSld>
@@ -2997,8 +2940,8 @@
         </p:nvSpPr>
         <p:spPr>
           <a:xfrm>
-            <a:off x="6227806" y="1"/>
-            <a:ext cx="2916194" cy="6857999"/>
+            <a:off x="8303740" y="0"/>
+            <a:ext cx="3888259" cy="6857999"/>
           </a:xfrm>
           <a:prstGeom prst="rect">
             <a:avLst/>
@@ -3058,8 +3001,8 @@
         </p:nvSpPr>
         <p:spPr>
           <a:xfrm>
-            <a:off x="6412230" y="685800"/>
-            <a:ext cx="2400300" cy="1737360"/>
+            <a:off x="8549640" y="685800"/>
+            <a:ext cx="3200400" cy="1737360"/>
           </a:xfrm>
         </p:spPr>
         <p:txBody>
@@ -3068,7 +3011,7 @@
           </a:bodyPr>
           <a:lstStyle>
             <a:lvl1pPr>
-              <a:defRPr sz="2800" b="0"/>
+              <a:defRPr sz="3200" b="1"/>
             </a:lvl1pPr>
           </a:lstStyle>
           <a:p>
@@ -3093,7 +3036,7 @@
         <p:spPr>
           <a:xfrm>
             <a:off x="0" y="0"/>
-            <a:ext cx="6227805" cy="6858000"/>
+            <a:ext cx="8303740" cy="6858000"/>
           </a:xfrm>
           <a:solidFill>
             <a:schemeClr val="tx2">
@@ -3163,8 +3106,8 @@
         </p:nvSpPr>
         <p:spPr>
           <a:xfrm>
-            <a:off x="6412230" y="2423160"/>
-            <a:ext cx="2400300" cy="3291840"/>
+            <a:off x="8549640" y="2423160"/>
+            <a:ext cx="3200400" cy="3291840"/>
           </a:xfrm>
         </p:spPr>
         <p:txBody>
@@ -3180,10 +3123,10 @@
                 <a:spcPts val="1000"/>
               </a:spcBef>
               <a:buNone/>
-              <a:defRPr sz="1350">
+              <a:defRPr sz="1400">
                 <a:solidFill>
                   <a:schemeClr val="accent1">
-                    <a:lumMod val="50000"/>
+                    <a:lumMod val="75000"/>
                   </a:schemeClr>
                 </a:solidFill>
               </a:defRPr>
@@ -3230,32 +3173,55 @@
           </a:p>
         </p:txBody>
       </p:sp>
+      <p:sp>
+        <p:nvSpPr>
+          <p:cNvPr id="5" name="Date Placeholder 4"/>
+          <p:cNvSpPr>
+            <a:spLocks noGrp="1"/>
+          </p:cNvSpPr>
+          <p:nvPr>
+            <p:ph type="dt" sz="half" idx="10"/>
+          </p:nvPr>
+        </p:nvSpPr>
+        <p:spPr/>
+        <p:txBody>
+          <a:bodyPr/>
+          <a:lstStyle/>
+          <a:p>
+            <a:fld id="{3772C379-9A7C-4C87-A116-CBE9F58B04C5}" type="datetimeFigureOut">
+              <a:rPr lang="en-US" smtClean="0"/>
+              <a:t>2/1/2018</a:t>
+            </a:fld>
+            <a:endParaRPr lang="en-US" dirty="0"/>
+          </a:p>
+        </p:txBody>
+      </p:sp>
       <p:grpSp>
         <p:nvGrpSpPr>
-          <p:cNvPr id="12" name="Group 11"/>
-          <p:cNvGrpSpPr/>
+          <p:cNvPr id="8" name="Group 7"/>
+          <p:cNvGrpSpPr>
+            <a:grpSpLocks noChangeAspect="1"/>
+          </p:cNvGrpSpPr>
           <p:nvPr/>
         </p:nvGrpSpPr>
         <p:grpSpPr>
           <a:xfrm>
-            <a:off x="8522664" y="6255258"/>
-            <a:ext cx="393192" cy="393192"/>
-            <a:chOff x="8532189" y="5068824"/>
-            <a:chExt cx="393192" cy="393192"/>
+            <a:off x="11401725" y="6229681"/>
+            <a:ext cx="457200" cy="457200"/>
+            <a:chOff x="11361456" y="6195813"/>
+            <a:chExt cx="548640" cy="548640"/>
           </a:xfrm>
         </p:grpSpPr>
         <p:sp>
           <p:nvSpPr>
-            <p:cNvPr id="13" name="Oval 12"/>
-            <p:cNvSpPr>
-              <a:spLocks noChangeAspect="1"/>
-            </p:cNvSpPr>
+            <p:cNvPr id="9" name="Oval 8"/>
+            <p:cNvSpPr/>
             <p:nvPr/>
           </p:nvSpPr>
           <p:spPr>
             <a:xfrm>
-              <a:off x="8532189" y="5068824"/>
-              <a:ext cx="393192" cy="393192"/>
+              <a:off x="11361456" y="6195813"/>
+              <a:ext cx="548640" cy="548640"/>
             </a:xfrm>
             <a:prstGeom prst="ellipse">
               <a:avLst/>
@@ -3296,16 +3262,14 @@
         </p:sp>
         <p:sp>
           <p:nvSpPr>
-            <p:cNvPr id="14" name="Oval 13"/>
-            <p:cNvSpPr>
-              <a:spLocks noChangeAspect="1"/>
-            </p:cNvSpPr>
+            <p:cNvPr id="10" name="Oval 9"/>
+            <p:cNvSpPr/>
             <p:nvPr/>
           </p:nvSpPr>
           <p:spPr>
             <a:xfrm>
-              <a:off x="8568766" y="5105400"/>
-              <a:ext cx="320039" cy="320040"/>
+              <a:off x="11396488" y="6230844"/>
+              <a:ext cx="478576" cy="478578"/>
             </a:xfrm>
             <a:prstGeom prst="ellipse">
               <a:avLst/>
@@ -3313,7 +3277,7 @@
             <a:noFill/>
             <a:ln w="12700" cap="flat" cmpd="sng" algn="ctr">
               <a:solidFill>
-                <a:srgbClr val="FFFFFF"/>
+                <a:sysClr val="window" lastClr="FFFFFF"/>
               </a:solidFill>
               <a:prstDash val="solid"/>
             </a:ln>
@@ -3323,30 +3287,7 @@
       </p:grpSp>
       <p:sp>
         <p:nvSpPr>
-          <p:cNvPr id="8" name="Date Placeholder 7"/>
-          <p:cNvSpPr>
-            <a:spLocks noGrp="1"/>
-          </p:cNvSpPr>
-          <p:nvPr>
-            <p:ph type="dt" sz="half" idx="10"/>
-          </p:nvPr>
-        </p:nvSpPr>
-        <p:spPr/>
-        <p:txBody>
-          <a:bodyPr/>
-          <a:lstStyle/>
-          <a:p>
-            <a:fld id="{3772C379-9A7C-4C87-A116-CBE9F58B04C5}" type="datetimeFigureOut">
-              <a:rPr lang="en-US" smtClean="0"/>
-              <a:t>10/7/2017</a:t>
-            </a:fld>
-            <a:endParaRPr lang="en-US" dirty="0"/>
-          </a:p>
-        </p:txBody>
-      </p:sp>
-      <p:sp>
-        <p:nvSpPr>
-          <p:cNvPr id="10" name="Slide Number Placeholder 9"/>
+          <p:cNvPr id="7" name="Slide Number Placeholder 6"/>
           <p:cNvSpPr>
             <a:spLocks noGrp="1"/>
           </p:cNvSpPr>
@@ -3370,7 +3311,7 @@
     </p:spTree>
     <p:extLst>
       <p:ext uri="{BB962C8B-B14F-4D97-AF65-F5344CB8AC3E}">
-        <p14:creationId xmlns:p14="http://schemas.microsoft.com/office/powerpoint/2010/main" val="2158190721"/>
+        <p14:creationId xmlns:p14="http://schemas.microsoft.com/office/powerpoint/2010/main" val="2352678023"/>
       </p:ext>
     </p:extLst>
   </p:cSld>
@@ -3402,32 +3343,201 @@
           <a:chExt cx="0" cy="0"/>
         </a:xfrm>
       </p:grpSpPr>
+      <p:sp>
+        <p:nvSpPr>
+          <p:cNvPr id="2" name="Title Placeholder 1"/>
+          <p:cNvSpPr>
+            <a:spLocks noGrp="1"/>
+          </p:cNvSpPr>
+          <p:nvPr>
+            <p:ph type="title"/>
+          </p:nvPr>
+        </p:nvSpPr>
+        <p:spPr>
+          <a:xfrm>
+            <a:off x="1069848" y="484632"/>
+            <a:ext cx="10058400" cy="1609344"/>
+          </a:xfrm>
+          <a:prstGeom prst="rect">
+            <a:avLst/>
+          </a:prstGeom>
+        </p:spPr>
+        <p:txBody>
+          <a:bodyPr vert="horz" lIns="91440" tIns="45720" rIns="91440" bIns="45720" rtlCol="0" anchor="ctr">
+            <a:normAutofit/>
+          </a:bodyPr>
+          <a:lstStyle/>
+          <a:p>
+            <a:r>
+              <a:rPr lang="en-US"/>
+              <a:t>Click to edit Master title style</a:t>
+            </a:r>
+            <a:endParaRPr lang="en-US" dirty="0"/>
+          </a:p>
+        </p:txBody>
+      </p:sp>
+      <p:sp>
+        <p:nvSpPr>
+          <p:cNvPr id="3" name="Text Placeholder 2"/>
+          <p:cNvSpPr>
+            <a:spLocks noGrp="1"/>
+          </p:cNvSpPr>
+          <p:nvPr>
+            <p:ph type="body" idx="1"/>
+          </p:nvPr>
+        </p:nvSpPr>
+        <p:spPr>
+          <a:xfrm>
+            <a:off x="1069848" y="2121408"/>
+            <a:ext cx="10058400" cy="4050792"/>
+          </a:xfrm>
+          <a:prstGeom prst="rect">
+            <a:avLst/>
+          </a:prstGeom>
+        </p:spPr>
+        <p:txBody>
+          <a:bodyPr vert="horz" lIns="91440" tIns="45720" rIns="91440" bIns="45720" rtlCol="0">
+            <a:normAutofit/>
+          </a:bodyPr>
+          <a:lstStyle/>
+          <a:p>
+            <a:pPr lvl="0"/>
+            <a:r>
+              <a:rPr lang="en-US"/>
+              <a:t>Edit Master text styles</a:t>
+            </a:r>
+          </a:p>
+          <a:p>
+            <a:pPr lvl="1"/>
+            <a:r>
+              <a:rPr lang="en-US"/>
+              <a:t>Second level</a:t>
+            </a:r>
+          </a:p>
+          <a:p>
+            <a:pPr lvl="2"/>
+            <a:r>
+              <a:rPr lang="en-US"/>
+              <a:t>Third level</a:t>
+            </a:r>
+          </a:p>
+          <a:p>
+            <a:pPr lvl="3"/>
+            <a:r>
+              <a:rPr lang="en-US"/>
+              <a:t>Fourth level</a:t>
+            </a:r>
+          </a:p>
+          <a:p>
+            <a:pPr lvl="4"/>
+            <a:r>
+              <a:rPr lang="en-US"/>
+              <a:t>Fifth level</a:t>
+            </a:r>
+            <a:endParaRPr lang="en-US" dirty="0"/>
+          </a:p>
+        </p:txBody>
+      </p:sp>
+      <p:sp>
+        <p:nvSpPr>
+          <p:cNvPr id="4" name="Date Placeholder 3"/>
+          <p:cNvSpPr>
+            <a:spLocks noGrp="1"/>
+          </p:cNvSpPr>
+          <p:nvPr>
+            <p:ph type="dt" sz="half" idx="2"/>
+          </p:nvPr>
+        </p:nvSpPr>
+        <p:spPr>
+          <a:xfrm>
+            <a:off x="7964424" y="6272784"/>
+            <a:ext cx="3273552" cy="365125"/>
+          </a:xfrm>
+          <a:prstGeom prst="rect">
+            <a:avLst/>
+          </a:prstGeom>
+        </p:spPr>
+        <p:txBody>
+          <a:bodyPr vert="horz" lIns="91440" tIns="45720" rIns="91440" bIns="45720" rtlCol="0" anchor="ctr"/>
+          <a:lstStyle>
+            <a:lvl1pPr algn="r">
+              <a:defRPr sz="1100">
+                <a:solidFill>
+                  <a:schemeClr val="tx2"/>
+                </a:solidFill>
+              </a:defRPr>
+            </a:lvl1pPr>
+          </a:lstStyle>
+          <a:p>
+            <a:fld id="{8664C608-40B1-4030-A28D-5B74BC98ADCE}" type="datetimeFigureOut">
+              <a:rPr lang="en-US" smtClean="0"/>
+              <a:t>2/1/2018</a:t>
+            </a:fld>
+            <a:endParaRPr lang="en-US" dirty="0"/>
+          </a:p>
+        </p:txBody>
+      </p:sp>
+      <p:sp>
+        <p:nvSpPr>
+          <p:cNvPr id="5" name="Footer Placeholder 4"/>
+          <p:cNvSpPr>
+            <a:spLocks noGrp="1"/>
+          </p:cNvSpPr>
+          <p:nvPr>
+            <p:ph type="ftr" sz="quarter" idx="3"/>
+          </p:nvPr>
+        </p:nvSpPr>
+        <p:spPr>
+          <a:xfrm>
+            <a:off x="1088136" y="6272784"/>
+            <a:ext cx="6327648" cy="365125"/>
+          </a:xfrm>
+          <a:prstGeom prst="rect">
+            <a:avLst/>
+          </a:prstGeom>
+        </p:spPr>
+        <p:txBody>
+          <a:bodyPr vert="horz" lIns="91440" tIns="45720" rIns="91440" bIns="45720" rtlCol="0" anchor="ctr"/>
+          <a:lstStyle>
+            <a:lvl1pPr algn="l">
+              <a:defRPr sz="1100">
+                <a:solidFill>
+                  <a:schemeClr val="tx2"/>
+                </a:solidFill>
+              </a:defRPr>
+            </a:lvl1pPr>
+          </a:lstStyle>
+          <a:p>
+            <a:endParaRPr lang="en-US" dirty="0"/>
+          </a:p>
+        </p:txBody>
+      </p:sp>
       <p:grpSp>
         <p:nvGrpSpPr>
-          <p:cNvPr id="12" name="Group 11"/>
-          <p:cNvGrpSpPr/>
+          <p:cNvPr id="7" name="Group 6"/>
+          <p:cNvGrpSpPr>
+            <a:grpSpLocks noChangeAspect="1"/>
+          </p:cNvGrpSpPr>
           <p:nvPr/>
         </p:nvGrpSpPr>
         <p:grpSpPr>
           <a:xfrm>
-            <a:off x="8522664" y="6255258"/>
-            <a:ext cx="393192" cy="393192"/>
-            <a:chOff x="8532189" y="5068824"/>
-            <a:chExt cx="393192" cy="393192"/>
+            <a:off x="11401725" y="6229681"/>
+            <a:ext cx="457200" cy="457200"/>
+            <a:chOff x="11361456" y="6195813"/>
+            <a:chExt cx="548640" cy="548640"/>
           </a:xfrm>
         </p:grpSpPr>
         <p:sp>
           <p:nvSpPr>
             <p:cNvPr id="8" name="Oval 7"/>
-            <p:cNvSpPr>
-              <a:spLocks noChangeAspect="1"/>
-            </p:cNvSpPr>
+            <p:cNvSpPr/>
             <p:nvPr/>
           </p:nvSpPr>
           <p:spPr>
             <a:xfrm>
-              <a:off x="8532189" y="5068824"/>
-              <a:ext cx="393192" cy="393192"/>
+              <a:off x="11361456" y="6195813"/>
+              <a:ext cx="548640" cy="548640"/>
             </a:xfrm>
             <a:prstGeom prst="ellipse">
               <a:avLst/>
@@ -3469,15 +3579,13 @@
         <p:sp>
           <p:nvSpPr>
             <p:cNvPr id="9" name="Oval 8"/>
-            <p:cNvSpPr>
-              <a:spLocks noChangeAspect="1"/>
-            </p:cNvSpPr>
+            <p:cNvSpPr/>
             <p:nvPr/>
           </p:nvSpPr>
           <p:spPr>
             <a:xfrm>
-              <a:off x="8568766" y="5105400"/>
-              <a:ext cx="320039" cy="320040"/>
+              <a:off x="11396488" y="6230844"/>
+              <a:ext cx="478576" cy="478578"/>
             </a:xfrm>
             <a:prstGeom prst="ellipse">
               <a:avLst/>
@@ -3495,205 +3603,32 @@
       </p:grpSp>
       <p:sp>
         <p:nvSpPr>
-          <p:cNvPr id="2" name="Title Placeholder 1"/>
-          <p:cNvSpPr>
-            <a:spLocks noGrp="1"/>
-          </p:cNvSpPr>
-          <p:nvPr>
-            <p:ph type="title"/>
+          <p:cNvPr id="6" name="Slide Number Placeholder 5"/>
+          <p:cNvSpPr>
+            <a:spLocks noGrp="1"/>
+          </p:cNvSpPr>
+          <p:nvPr>
+            <p:ph type="sldNum" sz="quarter" idx="4"/>
           </p:nvPr>
         </p:nvSpPr>
         <p:spPr>
           <a:xfrm>
-            <a:off x="685800" y="484632"/>
-            <a:ext cx="7772400" cy="1609344"/>
+            <a:off x="11311128" y="6272784"/>
+            <a:ext cx="640080" cy="365125"/>
           </a:xfrm>
           <a:prstGeom prst="rect">
             <a:avLst/>
           </a:prstGeom>
         </p:spPr>
         <p:txBody>
-          <a:bodyPr vert="horz" lIns="91440" tIns="45720" rIns="91440" bIns="45720" rtlCol="0" anchor="ctr">
-            <a:normAutofit/>
-          </a:bodyPr>
-          <a:lstStyle/>
-          <a:p>
-            <a:r>
-              <a:rPr lang="en-US"/>
-              <a:t>Click to edit Master title style</a:t>
-            </a:r>
-            <a:endParaRPr lang="en-US" dirty="0"/>
-          </a:p>
-        </p:txBody>
-      </p:sp>
-      <p:sp>
-        <p:nvSpPr>
-          <p:cNvPr id="3" name="Text Placeholder 2"/>
-          <p:cNvSpPr>
-            <a:spLocks noGrp="1"/>
-          </p:cNvSpPr>
-          <p:nvPr>
-            <p:ph type="body" idx="1"/>
-          </p:nvPr>
-        </p:nvSpPr>
-        <p:spPr>
-          <a:xfrm>
-            <a:off x="685800" y="2121408"/>
-            <a:ext cx="7772400" cy="4050792"/>
-          </a:xfrm>
-          <a:prstGeom prst="rect">
-            <a:avLst/>
-          </a:prstGeom>
-        </p:spPr>
-        <p:txBody>
-          <a:bodyPr vert="horz" lIns="91440" tIns="45720" rIns="91440" bIns="45720" rtlCol="0">
-            <a:normAutofit/>
-          </a:bodyPr>
-          <a:lstStyle/>
-          <a:p>
-            <a:pPr lvl="0"/>
-            <a:r>
-              <a:rPr lang="en-US"/>
-              <a:t>Edit Master text styles</a:t>
-            </a:r>
-          </a:p>
-          <a:p>
-            <a:pPr lvl="1"/>
-            <a:r>
-              <a:rPr lang="en-US"/>
-              <a:t>Second level</a:t>
-            </a:r>
-          </a:p>
-          <a:p>
-            <a:pPr lvl="2"/>
-            <a:r>
-              <a:rPr lang="en-US"/>
-              <a:t>Third level</a:t>
-            </a:r>
-          </a:p>
-          <a:p>
-            <a:pPr lvl="3"/>
-            <a:r>
-              <a:rPr lang="en-US"/>
-              <a:t>Fourth level</a:t>
-            </a:r>
-          </a:p>
-          <a:p>
-            <a:pPr lvl="4"/>
-            <a:r>
-              <a:rPr lang="en-US"/>
-              <a:t>Fifth level</a:t>
-            </a:r>
-            <a:endParaRPr lang="en-US" dirty="0"/>
-          </a:p>
-        </p:txBody>
-      </p:sp>
-      <p:sp>
-        <p:nvSpPr>
-          <p:cNvPr id="4" name="Date Placeholder 3"/>
-          <p:cNvSpPr>
-            <a:spLocks noGrp="1"/>
-          </p:cNvSpPr>
-          <p:nvPr>
-            <p:ph type="dt" sz="half" idx="2"/>
-          </p:nvPr>
-        </p:nvSpPr>
-        <p:spPr>
-          <a:xfrm>
-            <a:off x="5992368" y="6272785"/>
-            <a:ext cx="2455164" cy="365125"/>
-          </a:xfrm>
-          <a:prstGeom prst="rect">
-            <a:avLst/>
-          </a:prstGeom>
-        </p:spPr>
-        <p:txBody>
-          <a:bodyPr vert="horz" lIns="91440" tIns="45720" rIns="91440" bIns="45720" rtlCol="0" anchor="ctr"/>
-          <a:lstStyle>
-            <a:lvl1pPr algn="r">
-              <a:defRPr sz="1000">
-                <a:solidFill>
-                  <a:schemeClr val="accent1">
-                    <a:lumMod val="50000"/>
-                  </a:schemeClr>
-                </a:solidFill>
-              </a:defRPr>
-            </a:lvl1pPr>
-          </a:lstStyle>
-          <a:p>
-            <a:fld id="{8664C608-40B1-4030-A28D-5B74BC98ADCE}" type="datetimeFigureOut">
-              <a:rPr lang="en-US" smtClean="0"/>
-              <a:t>10/7/2017</a:t>
-            </a:fld>
-            <a:endParaRPr lang="en-US" dirty="0"/>
-          </a:p>
-        </p:txBody>
-      </p:sp>
-      <p:sp>
-        <p:nvSpPr>
-          <p:cNvPr id="5" name="Footer Placeholder 4"/>
-          <p:cNvSpPr>
-            <a:spLocks noGrp="1"/>
-          </p:cNvSpPr>
-          <p:nvPr>
-            <p:ph type="ftr" sz="quarter" idx="3"/>
-          </p:nvPr>
-        </p:nvSpPr>
-        <p:spPr>
-          <a:xfrm>
-            <a:off x="685800" y="6272785"/>
-            <a:ext cx="4745736" cy="365125"/>
-          </a:xfrm>
-          <a:prstGeom prst="rect">
-            <a:avLst/>
-          </a:prstGeom>
-        </p:spPr>
-        <p:txBody>
-          <a:bodyPr vert="horz" lIns="91440" tIns="45720" rIns="91440" bIns="45720" rtlCol="0" anchor="ctr"/>
-          <a:lstStyle>
-            <a:lvl1pPr algn="l">
-              <a:defRPr sz="1000">
-                <a:solidFill>
-                  <a:schemeClr val="accent1">
-                    <a:lumMod val="50000"/>
-                  </a:schemeClr>
-                </a:solidFill>
-              </a:defRPr>
-            </a:lvl1pPr>
-          </a:lstStyle>
-          <a:p>
-            <a:endParaRPr lang="en-US" dirty="0"/>
-          </a:p>
-        </p:txBody>
-      </p:sp>
-      <p:sp>
-        <p:nvSpPr>
-          <p:cNvPr id="6" name="Slide Number Placeholder 5"/>
-          <p:cNvSpPr>
-            <a:spLocks noGrp="1"/>
-          </p:cNvSpPr>
-          <p:nvPr>
-            <p:ph type="sldNum" sz="quarter" idx="4"/>
-          </p:nvPr>
-        </p:nvSpPr>
-        <p:spPr>
-          <a:xfrm>
-            <a:off x="8483346" y="6272785"/>
-            <a:ext cx="480060" cy="365125"/>
-          </a:xfrm>
-          <a:prstGeom prst="rect">
-            <a:avLst/>
-          </a:prstGeom>
-        </p:spPr>
-        <p:txBody>
           <a:bodyPr vert="horz" lIns="91440" tIns="45720" rIns="91440" bIns="45720" rtlCol="0" anchor="ctr"/>
           <a:lstStyle>
             <a:lvl1pPr algn="ctr">
-              <a:defRPr sz="1100" b="1" spc="-70" baseline="0">
+              <a:defRPr sz="1400" b="1">
                 <a:solidFill>
                   <a:srgbClr val="FFFFFF"/>
                 </a:solidFill>
-                <a:latin typeface="+mn-lt"/>
+                <a:latin typeface="+mj-lt"/>
               </a:defRPr>
             </a:lvl1pPr>
           </a:lstStyle>
@@ -3710,23 +3645,23 @@
     </p:spTree>
     <p:extLst>
       <p:ext uri="{BB962C8B-B14F-4D97-AF65-F5344CB8AC3E}">
-        <p14:creationId xmlns:p14="http://schemas.microsoft.com/office/powerpoint/2010/main" val="4038872160"/>
+        <p14:creationId xmlns:p14="http://schemas.microsoft.com/office/powerpoint/2010/main" val="2147907148"/>
       </p:ext>
     </p:extLst>
   </p:cSld>
   <p:clrMap bg1="lt1" tx1="dk1" bg2="lt2" tx2="dk2" accent1="accent1" accent2="accent2" accent3="accent3" accent4="accent4" accent5="accent5" accent6="accent6" hlink="hlink" folHlink="folHlink"/>
   <p:sldLayoutIdLst>
-    <p:sldLayoutId id="2147483853" r:id="rId1"/>
-    <p:sldLayoutId id="2147483854" r:id="rId2"/>
-    <p:sldLayoutId id="2147483855" r:id="rId3"/>
-    <p:sldLayoutId id="2147483856" r:id="rId4"/>
-    <p:sldLayoutId id="2147483857" r:id="rId5"/>
-    <p:sldLayoutId id="2147483858" r:id="rId6"/>
-    <p:sldLayoutId id="2147483859" r:id="rId7"/>
-    <p:sldLayoutId id="2147483860" r:id="rId8"/>
-    <p:sldLayoutId id="2147483861" r:id="rId9"/>
-    <p:sldLayoutId id="2147483862" r:id="rId10"/>
-    <p:sldLayoutId id="2147483863" r:id="rId11"/>
+    <p:sldLayoutId id="2147483865" r:id="rId1"/>
+    <p:sldLayoutId id="2147483866" r:id="rId2"/>
+    <p:sldLayoutId id="2147483867" r:id="rId3"/>
+    <p:sldLayoutId id="2147483868" r:id="rId4"/>
+    <p:sldLayoutId id="2147483869" r:id="rId5"/>
+    <p:sldLayoutId id="2147483870" r:id="rId6"/>
+    <p:sldLayoutId id="2147483871" r:id="rId7"/>
+    <p:sldLayoutId id="2147483872" r:id="rId8"/>
+    <p:sldLayoutId id="2147483873" r:id="rId9"/>
+    <p:sldLayoutId id="2147483874" r:id="rId10"/>
+    <p:sldLayoutId id="2147483875" r:id="rId11"/>
   </p:sldLayoutIdLst>
   <p:hf sldNum="0" hdr="0" ftr="0" dt="0"/>
   <p:txStyles>
@@ -3739,7 +3674,7 @@
           <a:spcPct val="0"/>
         </a:spcBef>
         <a:buNone/>
-        <a:defRPr sz="4200" b="0" kern="1200" cap="all" baseline="0">
+        <a:defRPr sz="5400" kern="1200" cap="all" baseline="0">
           <a:blipFill>
             <a:blip r:embed="rId15">
               <a:extLst>
@@ -4152,12 +4087,14 @@
         </p:nvSpPr>
         <p:spPr>
           <a:xfrm>
-            <a:off x="802386" y="5099900"/>
+            <a:off x="2326386" y="5099901"/>
             <a:ext cx="5918454" cy="359067"/>
           </a:xfrm>
         </p:spPr>
         <p:txBody>
-          <a:bodyPr/>
+          <a:bodyPr>
+            <a:normAutofit fontScale="92500" lnSpcReduction="10000"/>
+          </a:bodyPr>
           <a:lstStyle/>
           <a:p>
             <a:r>
@@ -4292,7 +4229,7 @@
         </p:nvSpPr>
         <p:spPr>
           <a:xfrm>
-            <a:off x="2721990" y="2356113"/>
+            <a:off x="4245990" y="2356113"/>
             <a:ext cx="961534" cy="431276"/>
           </a:xfrm>
           <a:prstGeom prst="rect">
@@ -4335,7 +4272,7 @@
         </p:nvSpPr>
         <p:spPr>
           <a:xfrm>
-            <a:off x="4120068" y="2356113"/>
+            <a:off x="5644068" y="2356113"/>
             <a:ext cx="961534" cy="431276"/>
           </a:xfrm>
           <a:prstGeom prst="rect">
@@ -4378,7 +4315,7 @@
         </p:nvSpPr>
         <p:spPr>
           <a:xfrm>
-            <a:off x="5518145" y="2356112"/>
+            <a:off x="7042145" y="2356112"/>
             <a:ext cx="961534" cy="431276"/>
           </a:xfrm>
           <a:prstGeom prst="rect">
@@ -4421,7 +4358,7 @@
         </p:nvSpPr>
         <p:spPr>
           <a:xfrm>
-            <a:off x="7015900" y="2356112"/>
+            <a:off x="8539900" y="2356112"/>
             <a:ext cx="961534" cy="431276"/>
           </a:xfrm>
           <a:prstGeom prst="rect">
@@ -4467,7 +4404,7 @@
         </p:nvCxnSpPr>
         <p:spPr>
           <a:xfrm flipH="1">
-            <a:off x="3202756" y="2787389"/>
+            <a:off x="4726756" y="2787389"/>
             <a:ext cx="2" cy="1824086"/>
           </a:xfrm>
           <a:prstGeom prst="line">
@@ -4499,7 +4436,7 @@
         </p:nvCxnSpPr>
         <p:spPr>
           <a:xfrm flipH="1">
-            <a:off x="4592863" y="2787389"/>
+            <a:off x="6116863" y="2787389"/>
             <a:ext cx="7972" cy="1824086"/>
           </a:xfrm>
           <a:prstGeom prst="line">
@@ -4531,7 +4468,7 @@
         </p:nvCxnSpPr>
         <p:spPr>
           <a:xfrm flipH="1">
-            <a:off x="5998910" y="2787388"/>
+            <a:off x="7522910" y="2787389"/>
             <a:ext cx="2" cy="1824087"/>
           </a:xfrm>
           <a:prstGeom prst="line">
@@ -4563,7 +4500,7 @@
         </p:nvCxnSpPr>
         <p:spPr>
           <a:xfrm>
-            <a:off x="7496667" y="2787388"/>
+            <a:off x="9020667" y="2787389"/>
             <a:ext cx="7970" cy="1753387"/>
           </a:xfrm>
           <a:prstGeom prst="line">
@@ -4593,7 +4530,7 @@
         </p:nvCxnSpPr>
         <p:spPr>
           <a:xfrm flipV="1">
-            <a:off x="5998911" y="3586309"/>
+            <a:off x="7522911" y="3586310"/>
             <a:ext cx="1497756" cy="14141"/>
           </a:xfrm>
           <a:prstGeom prst="straightConnector1">
@@ -4626,7 +4563,7 @@
         </p:nvSpPr>
         <p:spPr>
           <a:xfrm>
-            <a:off x="6391373" y="3586309"/>
+            <a:off x="7915373" y="3586309"/>
             <a:ext cx="886120" cy="300082"/>
           </a:xfrm>
           <a:prstGeom prst="rect">
@@ -4655,7 +4592,7 @@
         </p:nvCxnSpPr>
         <p:spPr>
           <a:xfrm flipV="1">
-            <a:off x="3202756" y="3071113"/>
+            <a:off x="4726757" y="3071114"/>
             <a:ext cx="2796155" cy="13223"/>
           </a:xfrm>
           <a:prstGeom prst="straightConnector1">
@@ -4688,7 +4625,7 @@
         </p:nvSpPr>
         <p:spPr>
           <a:xfrm>
-            <a:off x="3670212" y="3142102"/>
+            <a:off x="5194212" y="3142102"/>
             <a:ext cx="494046" cy="300082"/>
           </a:xfrm>
           <a:prstGeom prst="rect">
@@ -4717,7 +4654,7 @@
         </p:nvCxnSpPr>
         <p:spPr>
           <a:xfrm>
-            <a:off x="4608805" y="3337161"/>
+            <a:off x="6132805" y="3337161"/>
             <a:ext cx="1390106" cy="0"/>
           </a:xfrm>
           <a:prstGeom prst="straightConnector1">
@@ -4750,7 +4687,7 @@
         </p:nvSpPr>
         <p:spPr>
           <a:xfrm>
-            <a:off x="5008751" y="3365240"/>
+            <a:off x="6532751" y="3365240"/>
             <a:ext cx="494046" cy="300082"/>
           </a:xfrm>
           <a:prstGeom prst="rect">
@@ -4813,13 +4750,13 @@
         </p:nvSpPr>
         <p:spPr>
           <a:xfrm>
-            <a:off x="802386" y="1220724"/>
-            <a:ext cx="8341614" cy="1163669"/>
+            <a:off x="1069847" y="0"/>
+            <a:ext cx="10217277" cy="1163669"/>
           </a:xfrm>
         </p:spPr>
         <p:txBody>
           <a:bodyPr>
-            <a:normAutofit/>
+            <a:normAutofit fontScale="90000"/>
           </a:bodyPr>
           <a:lstStyle/>
           <a:p>
@@ -4840,7 +4777,12 @@
             <p:ph idx="1"/>
           </p:nvPr>
         </p:nvSpPr>
-        <p:spPr/>
+        <p:spPr>
+          <a:xfrm>
+            <a:off x="910971" y="1466850"/>
+            <a:ext cx="10217277" cy="4705350"/>
+          </a:xfrm>
+        </p:spPr>
         <p:txBody>
           <a:bodyPr/>
           <a:lstStyle/>
@@ -4918,7 +4860,7 @@
         </p:nvSpPr>
         <p:spPr>
           <a:xfrm>
-            <a:off x="1958420" y="2476306"/>
+            <a:off x="3482421" y="2476306"/>
             <a:ext cx="1042765" cy="431276"/>
           </a:xfrm>
           <a:prstGeom prst="rect">
@@ -4961,7 +4903,7 @@
         </p:nvSpPr>
         <p:spPr>
           <a:xfrm>
-            <a:off x="3356498" y="2476306"/>
+            <a:off x="4880498" y="2476306"/>
             <a:ext cx="961534" cy="431276"/>
           </a:xfrm>
           <a:prstGeom prst="rect">
@@ -5004,7 +4946,7 @@
         </p:nvSpPr>
         <p:spPr>
           <a:xfrm>
-            <a:off x="4754575" y="2476306"/>
+            <a:off x="6278575" y="2476306"/>
             <a:ext cx="961534" cy="431276"/>
           </a:xfrm>
           <a:prstGeom prst="rect">
@@ -5047,7 +4989,7 @@
         </p:nvSpPr>
         <p:spPr>
           <a:xfrm>
-            <a:off x="6063449" y="2476305"/>
+            <a:off x="7587449" y="2476305"/>
             <a:ext cx="1077534" cy="431276"/>
           </a:xfrm>
           <a:prstGeom prst="rect">
@@ -5092,7 +5034,7 @@
         </p:nvCxnSpPr>
         <p:spPr>
           <a:xfrm>
-            <a:off x="6602216" y="2907581"/>
+            <a:off x="8126217" y="2907582"/>
             <a:ext cx="55117" cy="1753387"/>
           </a:xfrm>
           <a:prstGeom prst="line">
@@ -5122,7 +5064,7 @@
         </p:nvCxnSpPr>
         <p:spPr>
           <a:xfrm>
-            <a:off x="5235342" y="3720643"/>
+            <a:off x="6759343" y="3720644"/>
             <a:ext cx="1414021" cy="14141"/>
           </a:xfrm>
           <a:prstGeom prst="straightConnector1">
@@ -5155,7 +5097,7 @@
         </p:nvSpPr>
         <p:spPr>
           <a:xfrm>
-            <a:off x="5582681" y="3706503"/>
+            <a:off x="7106681" y="3706503"/>
             <a:ext cx="776332" cy="300082"/>
           </a:xfrm>
           <a:prstGeom prst="rect">
@@ -5184,7 +5126,7 @@
         </p:nvCxnSpPr>
         <p:spPr>
           <a:xfrm flipV="1">
-            <a:off x="2439187" y="3191307"/>
+            <a:off x="3963188" y="3191308"/>
             <a:ext cx="2796155" cy="13223"/>
           </a:xfrm>
           <a:prstGeom prst="straightConnector1">
@@ -5217,7 +5159,7 @@
         </p:nvSpPr>
         <p:spPr>
           <a:xfrm>
-            <a:off x="2906642" y="3262295"/>
+            <a:off x="4430642" y="3262295"/>
             <a:ext cx="494046" cy="300082"/>
           </a:xfrm>
           <a:prstGeom prst="rect">
@@ -5246,7 +5188,7 @@
         </p:nvCxnSpPr>
         <p:spPr>
           <a:xfrm>
-            <a:off x="3845236" y="3457355"/>
+            <a:off x="5369236" y="3457355"/>
             <a:ext cx="1390106" cy="0"/>
           </a:xfrm>
           <a:prstGeom prst="straightConnector1">
@@ -5279,7 +5221,7 @@
         </p:nvSpPr>
         <p:spPr>
           <a:xfrm>
-            <a:off x="4245181" y="3485434"/>
+            <a:off x="5769181" y="3485434"/>
             <a:ext cx="494046" cy="300082"/>
           </a:xfrm>
           <a:prstGeom prst="rect">
@@ -5308,7 +5250,7 @@
         </p:nvCxnSpPr>
         <p:spPr>
           <a:xfrm flipH="1">
-            <a:off x="2439186" y="2907583"/>
+            <a:off x="3963186" y="2907583"/>
             <a:ext cx="2" cy="1824086"/>
           </a:xfrm>
           <a:prstGeom prst="line">
@@ -5338,7 +5280,7 @@
         </p:nvCxnSpPr>
         <p:spPr>
           <a:xfrm flipH="1">
-            <a:off x="3829293" y="2907583"/>
+            <a:off x="5353293" y="2907583"/>
             <a:ext cx="7972" cy="1824086"/>
           </a:xfrm>
           <a:prstGeom prst="line">
@@ -5368,7 +5310,7 @@
         </p:nvCxnSpPr>
         <p:spPr>
           <a:xfrm flipH="1">
-            <a:off x="5235340" y="2907581"/>
+            <a:off x="6759340" y="2907582"/>
             <a:ext cx="2" cy="1824087"/>
           </a:xfrm>
           <a:prstGeom prst="line">
@@ -5398,7 +5340,7 @@
         </p:nvSpPr>
         <p:spPr>
           <a:xfrm>
-            <a:off x="7529827" y="2476305"/>
+            <a:off x="9053827" y="2476305"/>
             <a:ext cx="961534" cy="431276"/>
           </a:xfrm>
           <a:prstGeom prst="rect">
@@ -5441,7 +5383,7 @@
         </p:nvCxnSpPr>
         <p:spPr>
           <a:xfrm>
-            <a:off x="8053016" y="2907581"/>
+            <a:off x="9577016" y="2907582"/>
             <a:ext cx="7970" cy="1753387"/>
           </a:xfrm>
           <a:prstGeom prst="line">
@@ -5471,7 +5413,7 @@
         </p:nvCxnSpPr>
         <p:spPr>
           <a:xfrm>
-            <a:off x="6657335" y="3842013"/>
+            <a:off x="8181336" y="3842014"/>
             <a:ext cx="1414021" cy="14141"/>
           </a:xfrm>
           <a:prstGeom prst="straightConnector1">
@@ -5504,7 +5446,7 @@
         </p:nvSpPr>
         <p:spPr>
           <a:xfrm>
-            <a:off x="7049797" y="3827872"/>
+            <a:off x="8573797" y="3827872"/>
             <a:ext cx="731210" cy="300082"/>
           </a:xfrm>
           <a:prstGeom prst="rect">
@@ -5533,7 +5475,7 @@
         </p:nvCxnSpPr>
         <p:spPr>
           <a:xfrm flipH="1">
-            <a:off x="6657333" y="4114251"/>
+            <a:off x="8181334" y="4114251"/>
             <a:ext cx="1395683" cy="0"/>
           </a:xfrm>
           <a:prstGeom prst="straightConnector1">
@@ -5566,7 +5508,7 @@
         </p:nvSpPr>
         <p:spPr>
           <a:xfrm>
-            <a:off x="6628142" y="4120060"/>
+            <a:off x="8152143" y="4120060"/>
             <a:ext cx="1480983" cy="300082"/>
           </a:xfrm>
           <a:prstGeom prst="rect">
@@ -5627,7 +5569,12 @@
             <p:ph type="title"/>
           </p:nvPr>
         </p:nvSpPr>
-        <p:spPr/>
+        <p:spPr>
+          <a:xfrm>
+            <a:off x="984123" y="0"/>
+            <a:ext cx="10058400" cy="1609344"/>
+          </a:xfrm>
+        </p:spPr>
         <p:txBody>
           <a:bodyPr/>
           <a:lstStyle/>
@@ -5649,7 +5596,12 @@
             <p:ph idx="1"/>
           </p:nvPr>
         </p:nvSpPr>
-        <p:spPr/>
+        <p:spPr>
+          <a:xfrm>
+            <a:off x="984123" y="1457325"/>
+            <a:ext cx="10144125" cy="4714875"/>
+          </a:xfrm>
+        </p:spPr>
         <p:txBody>
           <a:bodyPr/>
           <a:lstStyle/>
@@ -5750,7 +5702,12 @@
             <p:ph type="title"/>
           </p:nvPr>
         </p:nvSpPr>
-        <p:spPr/>
+        <p:spPr>
+          <a:xfrm>
+            <a:off x="1072896" y="0"/>
+            <a:ext cx="10058400" cy="1609344"/>
+          </a:xfrm>
+        </p:spPr>
         <p:txBody>
           <a:bodyPr/>
           <a:lstStyle/>
@@ -5772,10 +5729,15 @@
             <p:ph idx="1"/>
           </p:nvPr>
         </p:nvSpPr>
-        <p:spPr/>
+        <p:spPr>
+          <a:xfrm>
+            <a:off x="1069848" y="1438275"/>
+            <a:ext cx="10058400" cy="4733925"/>
+          </a:xfrm>
+        </p:spPr>
         <p:txBody>
           <a:bodyPr>
-            <a:normAutofit fontScale="92500" lnSpcReduction="20000"/>
+            <a:normAutofit/>
           </a:bodyPr>
           <a:lstStyle/>
           <a:p>
@@ -5979,37 +5941,42 @@
             <p:ph type="title"/>
           </p:nvPr>
         </p:nvSpPr>
-        <p:spPr/>
-        <p:txBody>
-          <a:bodyPr/>
-          <a:lstStyle/>
-          <a:p>
-            <a:r>
-              <a:rPr lang="en-US" dirty="0"/>
-              <a:t>Quick practice</a:t>
-            </a:r>
-          </a:p>
-        </p:txBody>
-      </p:sp>
-      <p:sp>
-        <p:nvSpPr>
-          <p:cNvPr id="3" name="Content Placeholder 2"/>
-          <p:cNvSpPr>
-            <a:spLocks noGrp="1"/>
-          </p:cNvSpPr>
-          <p:nvPr>
-            <p:ph idx="1"/>
-          </p:nvPr>
-        </p:nvSpPr>
         <p:spPr>
           <a:xfrm>
-            <a:off x="802386" y="2271271"/>
-            <a:ext cx="7543800" cy="3215129"/>
+            <a:off x="1222248" y="0"/>
+            <a:ext cx="10058400" cy="1609344"/>
           </a:xfrm>
         </p:spPr>
         <p:txBody>
+          <a:bodyPr/>
+          <a:lstStyle/>
+          <a:p>
+            <a:r>
+              <a:rPr lang="en-US" dirty="0"/>
+              <a:t>Quick practice</a:t>
+            </a:r>
+          </a:p>
+        </p:txBody>
+      </p:sp>
+      <p:sp>
+        <p:nvSpPr>
+          <p:cNvPr id="3" name="Content Placeholder 2"/>
+          <p:cNvSpPr>
+            <a:spLocks noGrp="1"/>
+          </p:cNvSpPr>
+          <p:nvPr>
+            <p:ph idx="1"/>
+          </p:nvPr>
+        </p:nvSpPr>
+        <p:spPr>
+          <a:xfrm>
+            <a:off x="1222248" y="1390650"/>
+            <a:ext cx="9464802" cy="5143500"/>
+          </a:xfrm>
+        </p:spPr>
+        <p:txBody>
           <a:bodyPr>
-            <a:normAutofit fontScale="92500" lnSpcReduction="20000"/>
+            <a:normAutofit/>
           </a:bodyPr>
           <a:lstStyle/>
           <a:p>
@@ -6153,37 +6120,42 @@
             <p:ph type="title"/>
           </p:nvPr>
         </p:nvSpPr>
-        <p:spPr/>
-        <p:txBody>
-          <a:bodyPr/>
-          <a:lstStyle/>
-          <a:p>
-            <a:r>
-              <a:rPr lang="en-US" dirty="0"/>
-              <a:t>Quick practice - continued</a:t>
-            </a:r>
-          </a:p>
-        </p:txBody>
-      </p:sp>
-      <p:sp>
-        <p:nvSpPr>
-          <p:cNvPr id="3" name="Content Placeholder 2"/>
-          <p:cNvSpPr>
-            <a:spLocks noGrp="1"/>
-          </p:cNvSpPr>
-          <p:nvPr>
-            <p:ph idx="1"/>
-          </p:nvPr>
-        </p:nvSpPr>
         <p:spPr>
           <a:xfrm>
-            <a:off x="802386" y="2271271"/>
-            <a:ext cx="7543800" cy="3215129"/>
+            <a:off x="1288923" y="0"/>
+            <a:ext cx="10058400" cy="1609344"/>
           </a:xfrm>
         </p:spPr>
         <p:txBody>
+          <a:bodyPr/>
+          <a:lstStyle/>
+          <a:p>
+            <a:r>
+              <a:rPr lang="en-US" dirty="0"/>
+              <a:t>Quick practice - continued</a:t>
+            </a:r>
+          </a:p>
+        </p:txBody>
+      </p:sp>
+      <p:sp>
+        <p:nvSpPr>
+          <p:cNvPr id="3" name="Content Placeholder 2"/>
+          <p:cNvSpPr>
+            <a:spLocks noGrp="1"/>
+          </p:cNvSpPr>
+          <p:nvPr>
+            <p:ph idx="1"/>
+          </p:nvPr>
+        </p:nvSpPr>
+        <p:spPr>
+          <a:xfrm>
+            <a:off x="1288923" y="1457326"/>
+            <a:ext cx="9398127" cy="5114924"/>
+          </a:xfrm>
+        </p:spPr>
+        <p:txBody>
           <a:bodyPr>
-            <a:normAutofit fontScale="77500" lnSpcReduction="20000"/>
+            <a:normAutofit/>
           </a:bodyPr>
           <a:lstStyle/>
           <a:p>
@@ -6376,7 +6348,12 @@
             <p:ph type="title"/>
           </p:nvPr>
         </p:nvSpPr>
-        <p:spPr/>
+        <p:spPr>
+          <a:xfrm>
+            <a:off x="1066800" y="0"/>
+            <a:ext cx="10058400" cy="1609344"/>
+          </a:xfrm>
+        </p:spPr>
         <p:txBody>
           <a:bodyPr/>
           <a:lstStyle/>
@@ -6495,7 +6472,12 @@
             <p:ph type="title"/>
           </p:nvPr>
         </p:nvSpPr>
-        <p:spPr/>
+        <p:spPr>
+          <a:xfrm>
+            <a:off x="1179921" y="0"/>
+            <a:ext cx="10058400" cy="1609344"/>
+          </a:xfrm>
+        </p:spPr>
         <p:txBody>
           <a:bodyPr/>
           <a:lstStyle/>
@@ -6528,7 +6510,7 @@
           </p:nvPr>
         </p:nvGraphicFramePr>
         <p:xfrm>
-          <a:off x="1150069" y="2093976"/>
+          <a:off x="2674070" y="2093976"/>
           <a:ext cx="7070103" cy="3723592"/>
         </p:xfrm>
         <a:graphic>
@@ -7027,7 +7009,12 @@
             <p:ph type="title"/>
           </p:nvPr>
         </p:nvSpPr>
-        <p:spPr/>
+        <p:spPr>
+          <a:xfrm>
+            <a:off x="1069848" y="0"/>
+            <a:ext cx="10058400" cy="1609344"/>
+          </a:xfrm>
+        </p:spPr>
         <p:txBody>
           <a:bodyPr/>
           <a:lstStyle/>
@@ -7128,7 +7115,12 @@
             <p:ph type="title"/>
           </p:nvPr>
         </p:nvSpPr>
-        <p:spPr/>
+        <p:spPr>
+          <a:xfrm>
+            <a:off x="1066800" y="0"/>
+            <a:ext cx="10058400" cy="1609344"/>
+          </a:xfrm>
+        </p:spPr>
         <p:txBody>
           <a:bodyPr/>
           <a:lstStyle/>
@@ -7550,7 +7542,7 @@
         </p:nvSpPr>
         <p:spPr bwMode="auto">
           <a:xfrm>
-            <a:off x="3932635" y="2789635"/>
+            <a:off x="5456635" y="2789635"/>
             <a:ext cx="3095048" cy="3095048"/>
           </a:xfrm>
           <a:prstGeom prst="rect">
@@ -7589,7 +7581,7 @@
         </p:nvSpPr>
         <p:spPr bwMode="auto">
           <a:xfrm>
-            <a:off x="4457700" y="3314700"/>
+            <a:off x="5981700" y="3314700"/>
             <a:ext cx="228600" cy="228600"/>
           </a:xfrm>
           <a:prstGeom prst="rect">
@@ -7634,7 +7626,7 @@
         </p:blipFill>
         <p:spPr>
           <a:xfrm>
-            <a:off x="4081364" y="2259635"/>
+            <a:off x="5605364" y="2259635"/>
             <a:ext cx="2500902" cy="2500902"/>
           </a:xfrm>
           <a:prstGeom prst="rect">
@@ -8065,7 +8057,7 @@
         </p:blipFill>
         <p:spPr bwMode="auto">
           <a:xfrm>
-            <a:off x="2429170" y="2427732"/>
+            <a:off x="3953171" y="2427732"/>
             <a:ext cx="3571875" cy="2800350"/>
           </a:xfrm>
           <a:prstGeom prst="rect">
@@ -8106,7 +8098,7 @@
         </p:nvSpPr>
         <p:spPr bwMode="auto">
           <a:xfrm>
-            <a:off x="5829301" y="5257800"/>
+            <a:off x="7353302" y="5257800"/>
             <a:ext cx="1617751" cy="300082"/>
           </a:xfrm>
           <a:prstGeom prst="rect">
@@ -8405,7 +8397,7 @@
         </p:blipFill>
         <p:spPr bwMode="auto">
           <a:xfrm>
-            <a:off x="2707261" y="2240635"/>
+            <a:off x="4231262" y="2240636"/>
             <a:ext cx="3064669" cy="3450431"/>
           </a:xfrm>
           <a:prstGeom prst="rect">
@@ -8559,7 +8551,7 @@
         </p:blipFill>
         <p:spPr>
           <a:xfrm>
-            <a:off x="3125912" y="1715914"/>
+            <a:off x="4649913" y="1715915"/>
             <a:ext cx="4773749" cy="4883545"/>
           </a:xfrm>
           <a:prstGeom prst="rect">

</xml_diff>

<commit_message>
revert changes for git introduction
</commit_message>
<xml_diff>
--- a/training_draft/git_introduction.pptx
+++ b/training_draft/git_introduction.pptx
@@ -2,7 +2,7 @@
 <file path=ppt/presentation.xml><?xml version="1.0" encoding="utf-8"?>
 <p:presentation xmlns:a="http://schemas.openxmlformats.org/drawingml/2006/main" xmlns:r="http://schemas.openxmlformats.org/officeDocument/2006/relationships" xmlns:p="http://schemas.openxmlformats.org/presentationml/2006/main" autoCompressPictures="0">
   <p:sldMasterIdLst>
-    <p:sldMasterId id="2147483864" r:id="rId1"/>
+    <p:sldMasterId id="2147483852" r:id="rId1"/>
   </p:sldMasterIdLst>
   <p:sldIdLst>
     <p:sldId id="256" r:id="rId2"/>
@@ -26,7 +26,7 @@
     <p:sldId id="262" r:id="rId20"/>
     <p:sldId id="273" r:id="rId21"/>
   </p:sldIdLst>
-  <p:sldSz cx="12192000" cy="6858000"/>
+  <p:sldSz cx="9144000" cy="6858000" type="screen4x3"/>
   <p:notesSz cx="6858000" cy="9144000"/>
   <p:defaultTextStyle>
     <a:defPPr>
@@ -160,15 +160,15 @@
         </p:nvSpPr>
         <p:spPr>
           <a:xfrm>
-            <a:off x="920834" y="1346946"/>
-            <a:ext cx="10222992" cy="80683"/>
+            <a:off x="685800" y="1346947"/>
+            <a:ext cx="7772400" cy="80683"/>
           </a:xfrm>
           <a:prstGeom prst="rect">
             <a:avLst/>
           </a:prstGeom>
           <a:blipFill dpi="0" rotWithShape="1">
             <a:blip r:embed="rId2">
-              <a:alphaModFix amt="85000"/>
+              <a:alphaModFix amt="80000"/>
               <a:lum bright="70000" contrast="-70000"/>
               <a:extLst>
                 <a:ext uri="{BEBA8EAE-BF5A-486C-A8C5-ECC9F3942E4B}">
@@ -217,15 +217,15 @@
         </p:nvSpPr>
         <p:spPr>
           <a:xfrm>
-            <a:off x="920834" y="4299696"/>
-            <a:ext cx="10222992" cy="80683"/>
+            <a:off x="685800" y="4282763"/>
+            <a:ext cx="7772400" cy="80683"/>
           </a:xfrm>
           <a:prstGeom prst="rect">
             <a:avLst/>
           </a:prstGeom>
           <a:blipFill dpi="0" rotWithShape="1">
             <a:blip r:embed="rId2">
-              <a:alphaModFix amt="85000"/>
+              <a:alphaModFix amt="80000"/>
               <a:lum bright="70000" contrast="-70000"/>
               <a:extLst>
                 <a:ext uri="{BEBA8EAE-BF5A-486C-A8C5-ECC9F3942E4B}">
@@ -274,15 +274,15 @@
         </p:nvSpPr>
         <p:spPr>
           <a:xfrm>
-            <a:off x="920834" y="1484779"/>
-            <a:ext cx="10222992" cy="2743200"/>
+            <a:off x="685800" y="1484779"/>
+            <a:ext cx="7772400" cy="2743200"/>
           </a:xfrm>
           <a:prstGeom prst="rect">
             <a:avLst/>
           </a:prstGeom>
           <a:blipFill dpi="0" rotWithShape="1">
             <a:blip r:embed="rId2">
-              <a:alphaModFix amt="85000"/>
+              <a:alphaModFix amt="80000"/>
               <a:lum bright="70000" contrast="-70000"/>
               <a:extLst>
                 <a:ext uri="{BEBA8EAE-BF5A-486C-A8C5-ECC9F3942E4B}">
@@ -326,13 +326,15 @@
       <p:grpSp>
         <p:nvGrpSpPr>
           <p:cNvPr id="10" name="Group 9"/>
-          <p:cNvGrpSpPr/>
+          <p:cNvGrpSpPr>
+            <a:grpSpLocks noChangeAspect="1"/>
+          </p:cNvGrpSpPr>
           <p:nvPr/>
         </p:nvGrpSpPr>
         <p:grpSpPr>
           <a:xfrm>
-            <a:off x="9649215" y="4068923"/>
-            <a:ext cx="1080904" cy="1080902"/>
+            <a:off x="7234780" y="4107023"/>
+            <a:ext cx="914400" cy="914400"/>
             <a:chOff x="9685338" y="4460675"/>
             <a:chExt cx="1080904" cy="1080902"/>
           </a:xfrm>
@@ -419,8 +421,8 @@
         </p:nvSpPr>
         <p:spPr>
           <a:xfrm>
-            <a:off x="1051560" y="1432223"/>
-            <a:ext cx="9966960" cy="3035808"/>
+            <a:off x="788670" y="1432223"/>
+            <a:ext cx="7593330" cy="3035808"/>
           </a:xfrm>
         </p:spPr>
         <p:txBody>
@@ -432,7 +434,7 @@
               <a:lnSpc>
                 <a:spcPct val="80000"/>
               </a:lnSpc>
-              <a:defRPr sz="9600" cap="all" baseline="0">
+              <a:defRPr sz="6400" b="0" cap="all" baseline="0">
                 <a:blipFill dpi="0" rotWithShape="1">
                   <a:blip r:embed="rId4"/>
                   <a:srcRect/>
@@ -462,8 +464,8 @@
         </p:nvSpPr>
         <p:spPr>
           <a:xfrm>
-            <a:off x="1069848" y="4389120"/>
-            <a:ext cx="7891272" cy="1069848"/>
+            <a:off x="802386" y="4389120"/>
+            <a:ext cx="5918454" cy="1069848"/>
           </a:xfrm>
         </p:spPr>
         <p:txBody>
@@ -473,7 +475,7 @@
           <a:lstStyle>
             <a:lvl1pPr marL="0" indent="0" algn="l">
               <a:buNone/>
-              <a:defRPr sz="2200">
+              <a:defRPr sz="1800" b="0">
                 <a:solidFill>
                   <a:schemeClr val="tx1"/>
                 </a:solidFill>
@@ -481,35 +483,35 @@
             </a:lvl1pPr>
             <a:lvl2pPr marL="457200" indent="0" algn="ctr">
               <a:buNone/>
-              <a:defRPr sz="2200"/>
+              <a:defRPr sz="1800"/>
             </a:lvl2pPr>
             <a:lvl3pPr marL="914400" indent="0" algn="ctr">
               <a:buNone/>
-              <a:defRPr sz="2200"/>
+              <a:defRPr sz="1800"/>
             </a:lvl3pPr>
             <a:lvl4pPr marL="1371600" indent="0" algn="ctr">
               <a:buNone/>
-              <a:defRPr sz="2000"/>
+              <a:defRPr sz="1800"/>
             </a:lvl4pPr>
             <a:lvl5pPr marL="1828800" indent="0" algn="ctr">
               <a:buNone/>
-              <a:defRPr sz="2000"/>
+              <a:defRPr sz="1800"/>
             </a:lvl5pPr>
             <a:lvl6pPr marL="2286000" indent="0" algn="ctr">
               <a:buNone/>
-              <a:defRPr sz="2000"/>
+              <a:defRPr sz="1800"/>
             </a:lvl6pPr>
             <a:lvl7pPr marL="2743200" indent="0" algn="ctr">
               <a:buNone/>
-              <a:defRPr sz="2000"/>
+              <a:defRPr sz="1800"/>
             </a:lvl7pPr>
             <a:lvl8pPr marL="3200400" indent="0" algn="ctr">
               <a:buNone/>
-              <a:defRPr sz="2000"/>
+              <a:defRPr sz="1800"/>
             </a:lvl8pPr>
             <a:lvl9pPr marL="3657600" indent="0" algn="ctr">
               <a:buNone/>
-              <a:defRPr sz="2000"/>
+              <a:defRPr sz="1800"/>
             </a:lvl9pPr>
           </a:lstStyle>
           <a:p>
@@ -538,7 +540,7 @@
           <a:p>
             <a:fld id="{83284890-85D2-4D7B-8EF5-15A9C1DB8F42}" type="datetimeFigureOut">
               <a:rPr lang="en-US" smtClean="0"/>
-              <a:t>2/1/2018</a:t>
+              <a:t>10/7/2017</a:t>
             </a:fld>
             <a:endParaRPr lang="en-US" dirty="0"/>
           </a:p>
@@ -552,38 +554,43 @@
           </p:cNvSpPr>
           <p:nvPr>
             <p:ph type="ftr" sz="quarter" idx="11"/>
-          </p:nvPr>
-        </p:nvSpPr>
-        <p:spPr/>
-        <p:txBody>
-          <a:bodyPr/>
-          <a:lstStyle/>
-          <a:p>
-            <a:endParaRPr lang="en-US" dirty="0"/>
-          </a:p>
-        </p:txBody>
-      </p:sp>
-      <p:sp>
-        <p:nvSpPr>
-          <p:cNvPr id="6" name="Slide Number Placeholder 5"/>
-          <p:cNvSpPr>
-            <a:spLocks noGrp="1"/>
-          </p:cNvSpPr>
-          <p:nvPr>
-            <p:ph type="sldNum" sz="quarter" idx="12"/>
           </p:nvPr>
         </p:nvSpPr>
         <p:spPr>
           <a:xfrm>
-            <a:off x="9592733" y="4289334"/>
-            <a:ext cx="1193868" cy="640080"/>
+            <a:off x="812805" y="6272785"/>
+            <a:ext cx="4745736" cy="365125"/>
+          </a:xfrm>
+        </p:spPr>
+        <p:txBody>
+          <a:bodyPr/>
+          <a:lstStyle/>
+          <a:p>
+            <a:endParaRPr lang="en-US" dirty="0"/>
+          </a:p>
+        </p:txBody>
+      </p:sp>
+      <p:sp>
+        <p:nvSpPr>
+          <p:cNvPr id="6" name="Slide Number Placeholder 5"/>
+          <p:cNvSpPr>
+            <a:spLocks noGrp="1"/>
+          </p:cNvSpPr>
+          <p:nvPr>
+            <p:ph type="sldNum" sz="quarter" idx="12"/>
+          </p:nvPr>
+        </p:nvSpPr>
+        <p:spPr>
+          <a:xfrm>
+            <a:off x="7244280" y="4227195"/>
+            <a:ext cx="895401" cy="640080"/>
           </a:xfrm>
         </p:spPr>
         <p:txBody>
           <a:bodyPr/>
           <a:lstStyle>
             <a:lvl1pPr>
-              <a:defRPr sz="2800"/>
+              <a:defRPr sz="2800" b="1"/>
             </a:lvl1pPr>
           </a:lstStyle>
           <a:p>
@@ -599,7 +606,7 @@
     </p:spTree>
     <p:extLst>
       <p:ext uri="{BB962C8B-B14F-4D97-AF65-F5344CB8AC3E}">
-        <p14:creationId xmlns:p14="http://schemas.microsoft.com/office/powerpoint/2010/main" val="1029453423"/>
+        <p14:creationId xmlns:p14="http://schemas.microsoft.com/office/powerpoint/2010/main" val="3352716659"/>
       </p:ext>
     </p:extLst>
   </p:cSld>
@@ -703,7 +710,7 @@
       </p:sp>
       <p:sp>
         <p:nvSpPr>
-          <p:cNvPr id="4" name="Date Placeholder 3"/>
+          <p:cNvPr id="7" name="Date Placeholder 6"/>
           <p:cNvSpPr>
             <a:spLocks noGrp="1"/>
           </p:cNvSpPr>
@@ -718,7 +725,7 @@
           <a:p>
             <a:fld id="{87157CC2-0FC8-4686-B024-99790E0F5162}" type="datetimeFigureOut">
               <a:rPr lang="en-US" smtClean="0"/>
-              <a:t>2/1/2018</a:t>
+              <a:t>10/7/2017</a:t>
             </a:fld>
             <a:endParaRPr lang="en-US" dirty="0"/>
           </a:p>
@@ -726,7 +733,7 @@
       </p:sp>
       <p:sp>
         <p:nvSpPr>
-          <p:cNvPr id="5" name="Footer Placeholder 4"/>
+          <p:cNvPr id="8" name="Footer Placeholder 7"/>
           <p:cNvSpPr>
             <a:spLocks noGrp="1"/>
           </p:cNvSpPr>
@@ -745,7 +752,7 @@
       </p:sp>
       <p:sp>
         <p:nvSpPr>
-          <p:cNvPr id="6" name="Slide Number Placeholder 5"/>
+          <p:cNvPr id="9" name="Slide Number Placeholder 8"/>
           <p:cNvSpPr>
             <a:spLocks noGrp="1"/>
           </p:cNvSpPr>
@@ -769,7 +776,7 @@
     </p:spTree>
     <p:extLst>
       <p:ext uri="{BB962C8B-B14F-4D97-AF65-F5344CB8AC3E}">
-        <p14:creationId xmlns:p14="http://schemas.microsoft.com/office/powerpoint/2010/main" val="2434730915"/>
+        <p14:creationId xmlns:p14="http://schemas.microsoft.com/office/powerpoint/2010/main" val="2096781959"/>
       </p:ext>
     </p:extLst>
   </p:cSld>
@@ -808,13 +815,17 @@
         </p:nvSpPr>
         <p:spPr>
           <a:xfrm>
-            <a:off x="8724900" y="533400"/>
-            <a:ext cx="2552700" cy="5638800"/>
+            <a:off x="6543675" y="533400"/>
+            <a:ext cx="1914525" cy="5638800"/>
           </a:xfrm>
         </p:spPr>
         <p:txBody>
           <a:bodyPr vert="eaVert"/>
-          <a:lstStyle/>
+          <a:lstStyle>
+            <a:lvl1pPr>
+              <a:defRPr b="0"/>
+            </a:lvl1pPr>
+          </a:lstStyle>
           <a:p>
             <a:r>
               <a:rPr lang="en-US"/>
@@ -836,8 +847,8 @@
         </p:nvSpPr>
         <p:spPr>
           <a:xfrm>
-            <a:off x="1066800" y="533400"/>
-            <a:ext cx="7505700" cy="5638800"/>
+            <a:off x="800100" y="533400"/>
+            <a:ext cx="5629275" cy="5638800"/>
           </a:xfrm>
         </p:spPr>
         <p:txBody>
@@ -883,7 +894,7 @@
       </p:sp>
       <p:sp>
         <p:nvSpPr>
-          <p:cNvPr id="4" name="Date Placeholder 3"/>
+          <p:cNvPr id="7" name="Date Placeholder 6"/>
           <p:cNvSpPr>
             <a:spLocks noGrp="1"/>
           </p:cNvSpPr>
@@ -898,7 +909,7 @@
           <a:p>
             <a:fld id="{F6764DA5-CD3D-4590-A511-FCD3BC7A793E}" type="datetimeFigureOut">
               <a:rPr lang="en-US" smtClean="0"/>
-              <a:t>2/1/2018</a:t>
+              <a:t>10/7/2017</a:t>
             </a:fld>
             <a:endParaRPr lang="en-US" dirty="0"/>
           </a:p>
@@ -906,7 +917,7 @@
       </p:sp>
       <p:sp>
         <p:nvSpPr>
-          <p:cNvPr id="5" name="Footer Placeholder 4"/>
+          <p:cNvPr id="8" name="Footer Placeholder 7"/>
           <p:cNvSpPr>
             <a:spLocks noGrp="1"/>
           </p:cNvSpPr>
@@ -925,7 +936,7 @@
       </p:sp>
       <p:sp>
         <p:nvSpPr>
-          <p:cNvPr id="6" name="Slide Number Placeholder 5"/>
+          <p:cNvPr id="9" name="Slide Number Placeholder 8"/>
           <p:cNvSpPr>
             <a:spLocks noGrp="1"/>
           </p:cNvSpPr>
@@ -949,7 +960,7 @@
     </p:spTree>
     <p:extLst>
       <p:ext uri="{BB962C8B-B14F-4D97-AF65-F5344CB8AC3E}">
-        <p14:creationId xmlns:p14="http://schemas.microsoft.com/office/powerpoint/2010/main" val="3690731296"/>
+        <p14:creationId xmlns:p14="http://schemas.microsoft.com/office/powerpoint/2010/main" val="2255161495"/>
       </p:ext>
     </p:extLst>
   </p:cSld>
@@ -1053,7 +1064,7 @@
       </p:sp>
       <p:sp>
         <p:nvSpPr>
-          <p:cNvPr id="4" name="Date Placeholder 3"/>
+          <p:cNvPr id="7" name="Date Placeholder 6"/>
           <p:cNvSpPr>
             <a:spLocks noGrp="1"/>
           </p:cNvSpPr>
@@ -1068,7 +1079,7 @@
           <a:p>
             <a:fld id="{82F5661D-6934-4B32-B92C-470368BF1EC6}" type="datetimeFigureOut">
               <a:rPr lang="en-US" smtClean="0"/>
-              <a:t>2/1/2018</a:t>
+              <a:t>10/7/2017</a:t>
             </a:fld>
             <a:endParaRPr lang="en-US" dirty="0"/>
           </a:p>
@@ -1076,7 +1087,7 @@
       </p:sp>
       <p:sp>
         <p:nvSpPr>
-          <p:cNvPr id="5" name="Footer Placeholder 4"/>
+          <p:cNvPr id="8" name="Footer Placeholder 7"/>
           <p:cNvSpPr>
             <a:spLocks noGrp="1"/>
           </p:cNvSpPr>
@@ -1095,7 +1106,7 @@
       </p:sp>
       <p:sp>
         <p:nvSpPr>
-          <p:cNvPr id="6" name="Slide Number Placeholder 5"/>
+          <p:cNvPr id="9" name="Slide Number Placeholder 8"/>
           <p:cNvSpPr>
             <a:spLocks noGrp="1"/>
           </p:cNvSpPr>
@@ -1119,7 +1130,7 @@
     </p:spTree>
     <p:extLst>
       <p:ext uri="{BB962C8B-B14F-4D97-AF65-F5344CB8AC3E}">
-        <p14:creationId xmlns:p14="http://schemas.microsoft.com/office/powerpoint/2010/main" val="187575826"/>
+        <p14:creationId xmlns:p14="http://schemas.microsoft.com/office/powerpoint/2010/main" val="2004638242"/>
       </p:ext>
     </p:extLst>
   </p:cSld>
@@ -1155,14 +1166,14 @@
         <p:spPr>
           <a:xfrm>
             <a:off x="0" y="4917989"/>
-            <a:ext cx="12192000" cy="1940010"/>
+            <a:ext cx="9144000" cy="1940010"/>
           </a:xfrm>
           <a:prstGeom prst="rect">
             <a:avLst/>
           </a:prstGeom>
           <a:blipFill dpi="0" rotWithShape="1">
             <a:blip r:embed="rId2">
-              <a:alphaModFix amt="85000"/>
+              <a:alphaModFix amt="80000"/>
               <a:lum bright="70000" contrast="-70000"/>
               <a:extLst>
                 <a:ext uri="{BEBA8EAE-BF5A-486C-A8C5-ECC9F3942E4B}">
@@ -1215,8 +1226,8 @@
         </p:nvSpPr>
         <p:spPr>
           <a:xfrm>
-            <a:off x="2167128" y="1225296"/>
-            <a:ext cx="9281160" cy="3520440"/>
+            <a:off x="1625346" y="1225296"/>
+            <a:ext cx="6960870" cy="3520440"/>
           </a:xfrm>
         </p:spPr>
         <p:txBody>
@@ -1228,7 +1239,7 @@
               <a:lnSpc>
                 <a:spcPct val="80000"/>
               </a:lnSpc>
-              <a:defRPr sz="8000" b="0"/>
+              <a:defRPr sz="6400" b="0"/>
             </a:lvl1pPr>
           </a:lstStyle>
           <a:p>
@@ -1252,8 +1263,8 @@
         </p:nvSpPr>
         <p:spPr>
           <a:xfrm>
-            <a:off x="2165774" y="5020056"/>
-            <a:ext cx="9052560" cy="1066800"/>
+            <a:off x="1624330" y="5020056"/>
+            <a:ext cx="6789420" cy="1066800"/>
           </a:xfrm>
         </p:spPr>
         <p:txBody>
@@ -1263,9 +1274,11 @@
           <a:lstStyle>
             <a:lvl1pPr marL="0" indent="0">
               <a:buNone/>
-              <a:defRPr sz="2000">
+              <a:defRPr sz="1800" b="0">
                 <a:solidFill>
-                  <a:schemeClr val="tx1"/>
+                  <a:schemeClr val="accent1">
+                    <a:lumMod val="50000"/>
+                  </a:schemeClr>
                 </a:solidFill>
               </a:defRPr>
             </a:lvl1pPr>
@@ -1371,17 +1384,27 @@
         </p:nvSpPr>
         <p:spPr>
           <a:xfrm>
-            <a:off x="8593667" y="6272784"/>
-            <a:ext cx="2644309" cy="365125"/>
+            <a:off x="6445251" y="6272785"/>
+            <a:ext cx="1983232" cy="365125"/>
           </a:xfrm>
         </p:spPr>
         <p:txBody>
           <a:bodyPr/>
-          <a:lstStyle/>
+          <a:lstStyle>
+            <a:lvl1pPr>
+              <a:defRPr>
+                <a:solidFill>
+                  <a:schemeClr val="accent1">
+                    <a:lumMod val="50000"/>
+                  </a:schemeClr>
+                </a:solidFill>
+              </a:defRPr>
+            </a:lvl1pPr>
+          </a:lstStyle>
           <a:p>
             <a:fld id="{C6F822A4-8DA6-4447-9B1F-C5DB58435268}" type="datetimeFigureOut">
               <a:rPr lang="en-US" smtClean="0"/>
-              <a:t>2/1/2018</a:t>
+              <a:t>10/7/2017</a:t>
             </a:fld>
             <a:endParaRPr lang="en-US" dirty="0"/>
           </a:p>
@@ -1399,13 +1422,23 @@
         </p:nvSpPr>
         <p:spPr>
           <a:xfrm>
-            <a:off x="2182708" y="6272784"/>
-            <a:ext cx="6327648" cy="365125"/>
+            <a:off x="1636099" y="6272784"/>
+            <a:ext cx="4745736" cy="365125"/>
           </a:xfrm>
         </p:spPr>
         <p:txBody>
           <a:bodyPr/>
-          <a:lstStyle/>
+          <a:lstStyle>
+            <a:lvl1pPr>
+              <a:defRPr>
+                <a:solidFill>
+                  <a:schemeClr val="accent1">
+                    <a:lumMod val="50000"/>
+                  </a:schemeClr>
+                </a:solidFill>
+              </a:defRPr>
+            </a:lvl1pPr>
+          </a:lstStyle>
           <a:p>
             <a:endParaRPr lang="en-US" dirty="0"/>
           </a:p>
@@ -1414,13 +1447,15 @@
       <p:grpSp>
         <p:nvGrpSpPr>
           <p:cNvPr id="8" name="Group 7"/>
-          <p:cNvGrpSpPr/>
+          <p:cNvGrpSpPr>
+            <a:grpSpLocks noChangeAspect="1"/>
+          </p:cNvGrpSpPr>
           <p:nvPr/>
         </p:nvGrpSpPr>
         <p:grpSpPr>
           <a:xfrm>
-            <a:off x="897399" y="2325848"/>
-            <a:ext cx="1080904" cy="1080902"/>
+            <a:off x="633862" y="2430623"/>
+            <a:ext cx="914400" cy="914400"/>
             <a:chOff x="9685338" y="4460675"/>
             <a:chExt cx="1080904" cy="1080902"/>
           </a:xfrm>
@@ -1507,8 +1542,8 @@
         </p:nvSpPr>
         <p:spPr>
           <a:xfrm>
-            <a:off x="843702" y="2506133"/>
-            <a:ext cx="1188298" cy="720332"/>
+            <a:off x="645450" y="2508607"/>
+            <a:ext cx="891224" cy="720332"/>
           </a:xfrm>
         </p:spPr>
         <p:txBody>
@@ -1531,7 +1566,7 @@
     </p:spTree>
     <p:extLst>
       <p:ext uri="{BB962C8B-B14F-4D97-AF65-F5344CB8AC3E}">
-        <p14:creationId xmlns:p14="http://schemas.microsoft.com/office/powerpoint/2010/main" val="4075843477"/>
+        <p14:creationId xmlns:p14="http://schemas.microsoft.com/office/powerpoint/2010/main" val="1437334881"/>
       </p:ext>
     </p:extLst>
   </p:cSld>
@@ -1593,8 +1628,8 @@
         </p:nvSpPr>
         <p:spPr>
           <a:xfrm>
-            <a:off x="1069848" y="2194560"/>
-            <a:ext cx="4754880" cy="3977640"/>
+            <a:off x="685800" y="2194560"/>
+            <a:ext cx="3657600" cy="3977640"/>
           </a:xfrm>
         </p:spPr>
         <p:txBody>
@@ -1678,8 +1713,8 @@
         </p:nvSpPr>
         <p:spPr>
           <a:xfrm>
-            <a:off x="6364224" y="2194560"/>
-            <a:ext cx="4754880" cy="3977640"/>
+            <a:off x="4792218" y="2194560"/>
+            <a:ext cx="3657600" cy="3977640"/>
           </a:xfrm>
         </p:spPr>
         <p:txBody>
@@ -1768,7 +1803,7 @@
           <a:p>
             <a:fld id="{E548D31E-DCDA-41A7-9C67-C4B11B94D21D}" type="datetimeFigureOut">
               <a:rPr lang="en-US" smtClean="0"/>
-              <a:t>2/1/2018</a:t>
+              <a:t>10/7/2017</a:t>
             </a:fld>
             <a:endParaRPr lang="en-US" dirty="0"/>
           </a:p>
@@ -1819,7 +1854,7 @@
     </p:spTree>
     <p:extLst>
       <p:ext uri="{BB962C8B-B14F-4D97-AF65-F5344CB8AC3E}">
-        <p14:creationId xmlns:p14="http://schemas.microsoft.com/office/powerpoint/2010/main" val="733083718"/>
+        <p14:creationId xmlns:p14="http://schemas.microsoft.com/office/powerpoint/2010/main" val="1598721154"/>
       </p:ext>
     </p:extLst>
   </p:cSld>
@@ -1881,8 +1916,8 @@
         </p:nvSpPr>
         <p:spPr>
           <a:xfrm>
-            <a:off x="1066800" y="2048256"/>
-            <a:ext cx="4754880" cy="640080"/>
+            <a:off x="685800" y="2048256"/>
+            <a:ext cx="3657600" cy="640080"/>
           </a:xfrm>
         </p:spPr>
         <p:txBody>
@@ -1954,8 +1989,8 @@
         </p:nvSpPr>
         <p:spPr>
           <a:xfrm>
-            <a:off x="1069848" y="2743200"/>
-            <a:ext cx="4754880" cy="3291840"/>
+            <a:off x="685800" y="2743200"/>
+            <a:ext cx="3657600" cy="3291840"/>
           </a:xfrm>
         </p:spPr>
         <p:txBody>
@@ -2039,8 +2074,8 @@
         </p:nvSpPr>
         <p:spPr>
           <a:xfrm>
-            <a:off x="6364224" y="2048256"/>
-            <a:ext cx="4754880" cy="640080"/>
+            <a:off x="4820793" y="2048256"/>
+            <a:ext cx="3657600" cy="640080"/>
           </a:xfrm>
         </p:spPr>
         <p:txBody>
@@ -2112,8 +2147,8 @@
         </p:nvSpPr>
         <p:spPr>
           <a:xfrm>
-            <a:off x="6364224" y="2743200"/>
-            <a:ext cx="4754880" cy="3291840"/>
+            <a:off x="4820793" y="2743200"/>
+            <a:ext cx="3657600" cy="3291840"/>
           </a:xfrm>
         </p:spPr>
         <p:txBody>
@@ -2202,7 +2237,7 @@
           <a:p>
             <a:fld id="{9B3762C0-B258-48F1-ADE6-176B4174CCDD}" type="datetimeFigureOut">
               <a:rPr lang="en-US" smtClean="0"/>
-              <a:t>2/1/2018</a:t>
+              <a:t>10/7/2017</a:t>
             </a:fld>
             <a:endParaRPr lang="en-US" dirty="0"/>
           </a:p>
@@ -2253,7 +2288,7 @@
     </p:spTree>
     <p:extLst>
       <p:ext uri="{BB962C8B-B14F-4D97-AF65-F5344CB8AC3E}">
-        <p14:creationId xmlns:p14="http://schemas.microsoft.com/office/powerpoint/2010/main" val="3314578632"/>
+        <p14:creationId xmlns:p14="http://schemas.microsoft.com/office/powerpoint/2010/main" val="2605488179"/>
       </p:ext>
     </p:extLst>
   </p:cSld>
@@ -2316,11 +2351,21 @@
         <p:spPr/>
         <p:txBody>
           <a:bodyPr/>
-          <a:lstStyle/>
+          <a:lstStyle>
+            <a:lvl1pPr>
+              <a:defRPr>
+                <a:solidFill>
+                  <a:schemeClr val="accent1">
+                    <a:lumMod val="50000"/>
+                  </a:schemeClr>
+                </a:solidFill>
+              </a:defRPr>
+            </a:lvl1pPr>
+          </a:lstStyle>
           <a:p>
             <a:fld id="{677919A6-33EB-49BD-A62F-1FA56B9F9712}" type="datetimeFigureOut">
               <a:rPr lang="en-US" smtClean="0"/>
-              <a:t>2/1/2018</a:t>
+              <a:t>10/7/2017</a:t>
             </a:fld>
             <a:endParaRPr lang="en-US" dirty="0"/>
           </a:p>
@@ -2339,7 +2384,17 @@
         <p:spPr/>
         <p:txBody>
           <a:bodyPr/>
-          <a:lstStyle/>
+          <a:lstStyle>
+            <a:lvl1pPr>
+              <a:defRPr>
+                <a:solidFill>
+                  <a:schemeClr val="accent1">
+                    <a:lumMod val="50000"/>
+                  </a:schemeClr>
+                </a:solidFill>
+              </a:defRPr>
+            </a:lvl1pPr>
+          </a:lstStyle>
           <a:p>
             <a:endParaRPr lang="en-US" dirty="0"/>
           </a:p>
@@ -2371,7 +2426,7 @@
     </p:spTree>
     <p:extLst>
       <p:ext uri="{BB962C8B-B14F-4D97-AF65-F5344CB8AC3E}">
-        <p14:creationId xmlns:p14="http://schemas.microsoft.com/office/powerpoint/2010/main" val="3027318834"/>
+        <p14:creationId xmlns:p14="http://schemas.microsoft.com/office/powerpoint/2010/main" val="3753203300"/>
       </p:ext>
     </p:extLst>
   </p:cSld>
@@ -2415,7 +2470,7 @@
           <a:p>
             <a:fld id="{CA4E7D1B-D673-4CF6-8672-009D42ABD2A0}" type="datetimeFigureOut">
               <a:rPr lang="en-US" smtClean="0"/>
-              <a:t>2/1/2018</a:t>
+              <a:t>10/7/2017</a:t>
             </a:fld>
             <a:endParaRPr lang="en-US" dirty="0"/>
           </a:p>
@@ -2466,7 +2521,7 @@
     </p:spTree>
     <p:extLst>
       <p:ext uri="{BB962C8B-B14F-4D97-AF65-F5344CB8AC3E}">
-        <p14:creationId xmlns:p14="http://schemas.microsoft.com/office/powerpoint/2010/main" val="1972203897"/>
+        <p14:creationId xmlns:p14="http://schemas.microsoft.com/office/powerpoint/2010/main" val="629240214"/>
       </p:ext>
     </p:extLst>
   </p:cSld>
@@ -2501,8 +2556,8 @@
         </p:nvSpPr>
         <p:spPr>
           <a:xfrm>
-            <a:off x="8303740" y="0"/>
-            <a:ext cx="3888259" cy="6857999"/>
+            <a:off x="6227806" y="1"/>
+            <a:ext cx="2916194" cy="6857999"/>
           </a:xfrm>
           <a:prstGeom prst="rect">
             <a:avLst/>
@@ -2562,8 +2617,8 @@
         </p:nvSpPr>
         <p:spPr>
           <a:xfrm>
-            <a:off x="8549640" y="685800"/>
-            <a:ext cx="3200400" cy="1737360"/>
+            <a:off x="6412230" y="685800"/>
+            <a:ext cx="2400300" cy="1737360"/>
           </a:xfrm>
         </p:spPr>
         <p:txBody>
@@ -2572,7 +2627,7 @@
           </a:bodyPr>
           <a:lstStyle>
             <a:lvl1pPr>
-              <a:defRPr sz="3200" b="1"/>
+              <a:defRPr sz="2800" b="0"/>
             </a:lvl1pPr>
           </a:lstStyle>
           <a:p>
@@ -2596,8 +2651,8 @@
         </p:nvSpPr>
         <p:spPr>
           <a:xfrm>
-            <a:off x="838200" y="685800"/>
-            <a:ext cx="6711696" cy="5020056"/>
+            <a:off x="628650" y="685800"/>
+            <a:ext cx="5033772" cy="5020056"/>
           </a:xfrm>
         </p:spPr>
         <p:txBody>
@@ -2681,8 +2736,8 @@
         </p:nvSpPr>
         <p:spPr>
           <a:xfrm>
-            <a:off x="8549640" y="2423160"/>
-            <a:ext cx="3200400" cy="3291840"/>
+            <a:off x="6412230" y="2423160"/>
+            <a:ext cx="2400300" cy="3291840"/>
           </a:xfrm>
         </p:spPr>
         <p:txBody>
@@ -2698,10 +2753,10 @@
                 <a:spcPts val="1000"/>
               </a:spcBef>
               <a:buNone/>
-              <a:defRPr sz="1400">
+              <a:defRPr sz="1350">
                 <a:solidFill>
                   <a:schemeClr val="accent1">
-                    <a:lumMod val="75000"/>
+                    <a:lumMod val="50000"/>
                   </a:schemeClr>
                 </a:solidFill>
               </a:defRPr>
@@ -2748,74 +2803,32 @@
           </a:p>
         </p:txBody>
       </p:sp>
-      <p:sp>
-        <p:nvSpPr>
-          <p:cNvPr id="5" name="Date Placeholder 4"/>
-          <p:cNvSpPr>
-            <a:spLocks noGrp="1"/>
-          </p:cNvSpPr>
-          <p:nvPr>
-            <p:ph type="dt" sz="half" idx="10"/>
-          </p:nvPr>
-        </p:nvSpPr>
-        <p:spPr/>
-        <p:txBody>
-          <a:bodyPr/>
-          <a:lstStyle/>
-          <a:p>
-            <a:fld id="{DA16AA21-1863-4931-97CB-99D0A168701B}" type="datetimeFigureOut">
-              <a:rPr lang="en-US" smtClean="0"/>
-              <a:t>2/1/2018</a:t>
-            </a:fld>
-            <a:endParaRPr lang="en-US" dirty="0"/>
-          </a:p>
-        </p:txBody>
-      </p:sp>
-      <p:sp>
-        <p:nvSpPr>
-          <p:cNvPr id="6" name="Footer Placeholder 5"/>
-          <p:cNvSpPr>
-            <a:spLocks noGrp="1"/>
-          </p:cNvSpPr>
-          <p:nvPr>
-            <p:ph type="ftr" sz="quarter" idx="11"/>
-          </p:nvPr>
-        </p:nvSpPr>
-        <p:spPr/>
-        <p:txBody>
-          <a:bodyPr/>
-          <a:lstStyle/>
-          <a:p>
-            <a:endParaRPr lang="en-US" dirty="0"/>
-          </a:p>
-        </p:txBody>
-      </p:sp>
       <p:grpSp>
         <p:nvGrpSpPr>
-          <p:cNvPr id="9" name="Group 8"/>
-          <p:cNvGrpSpPr>
-            <a:grpSpLocks noChangeAspect="1"/>
-          </p:cNvGrpSpPr>
+          <p:cNvPr id="12" name="Group 11"/>
+          <p:cNvGrpSpPr/>
           <p:nvPr/>
         </p:nvGrpSpPr>
         <p:grpSpPr>
           <a:xfrm>
-            <a:off x="11401725" y="6229681"/>
-            <a:ext cx="457200" cy="457200"/>
-            <a:chOff x="11361456" y="6195813"/>
-            <a:chExt cx="548640" cy="548640"/>
+            <a:off x="8522664" y="6255258"/>
+            <a:ext cx="393192" cy="393192"/>
+            <a:chOff x="8532189" y="5068824"/>
+            <a:chExt cx="393192" cy="393192"/>
           </a:xfrm>
         </p:grpSpPr>
         <p:sp>
           <p:nvSpPr>
-            <p:cNvPr id="10" name="Oval 9"/>
-            <p:cNvSpPr/>
+            <p:cNvPr id="13" name="Oval 12"/>
+            <p:cNvSpPr>
+              <a:spLocks noChangeAspect="1"/>
+            </p:cNvSpPr>
             <p:nvPr/>
           </p:nvSpPr>
           <p:spPr>
             <a:xfrm>
-              <a:off x="11361456" y="6195813"/>
-              <a:ext cx="548640" cy="548640"/>
+              <a:off x="8532189" y="5068824"/>
+              <a:ext cx="393192" cy="393192"/>
             </a:xfrm>
             <a:prstGeom prst="ellipse">
               <a:avLst/>
@@ -2856,14 +2869,16 @@
         </p:sp>
         <p:sp>
           <p:nvSpPr>
-            <p:cNvPr id="11" name="Oval 10"/>
-            <p:cNvSpPr/>
+            <p:cNvPr id="14" name="Oval 13"/>
+            <p:cNvSpPr>
+              <a:spLocks noChangeAspect="1"/>
+            </p:cNvSpPr>
             <p:nvPr/>
           </p:nvSpPr>
           <p:spPr>
             <a:xfrm>
-              <a:off x="11396488" y="6230844"/>
-              <a:ext cx="478576" cy="478578"/>
+              <a:off x="8568766" y="5105400"/>
+              <a:ext cx="320039" cy="320040"/>
             </a:xfrm>
             <a:prstGeom prst="ellipse">
               <a:avLst/>
@@ -2871,7 +2886,7 @@
             <a:noFill/>
             <a:ln w="12700" cap="flat" cmpd="sng" algn="ctr">
               <a:solidFill>
-                <a:sysClr val="window" lastClr="FFFFFF"/>
+                <a:srgbClr val="FFFFFF"/>
               </a:solidFill>
               <a:prstDash val="solid"/>
             </a:ln>
@@ -2881,7 +2896,49 @@
       </p:grpSp>
       <p:sp>
         <p:nvSpPr>
-          <p:cNvPr id="7" name="Slide Number Placeholder 6"/>
+          <p:cNvPr id="9" name="Date Placeholder 8"/>
+          <p:cNvSpPr>
+            <a:spLocks noGrp="1"/>
+          </p:cNvSpPr>
+          <p:nvPr>
+            <p:ph type="dt" sz="half" idx="10"/>
+          </p:nvPr>
+        </p:nvSpPr>
+        <p:spPr/>
+        <p:txBody>
+          <a:bodyPr/>
+          <a:lstStyle/>
+          <a:p>
+            <a:fld id="{DA16AA21-1863-4931-97CB-99D0A168701B}" type="datetimeFigureOut">
+              <a:rPr lang="en-US" smtClean="0"/>
+              <a:t>10/7/2017</a:t>
+            </a:fld>
+            <a:endParaRPr lang="en-US" dirty="0"/>
+          </a:p>
+        </p:txBody>
+      </p:sp>
+      <p:sp>
+        <p:nvSpPr>
+          <p:cNvPr id="10" name="Footer Placeholder 9"/>
+          <p:cNvSpPr>
+            <a:spLocks noGrp="1"/>
+          </p:cNvSpPr>
+          <p:nvPr>
+            <p:ph type="ftr" sz="quarter" idx="11"/>
+          </p:nvPr>
+        </p:nvSpPr>
+        <p:spPr/>
+        <p:txBody>
+          <a:bodyPr/>
+          <a:lstStyle/>
+          <a:p>
+            <a:endParaRPr lang="en-US" dirty="0"/>
+          </a:p>
+        </p:txBody>
+      </p:sp>
+      <p:sp>
+        <p:nvSpPr>
+          <p:cNvPr id="11" name="Slide Number Placeholder 10"/>
           <p:cNvSpPr>
             <a:spLocks noGrp="1"/>
           </p:cNvSpPr>
@@ -2905,7 +2962,7 @@
     </p:spTree>
     <p:extLst>
       <p:ext uri="{BB962C8B-B14F-4D97-AF65-F5344CB8AC3E}">
-        <p14:creationId xmlns:p14="http://schemas.microsoft.com/office/powerpoint/2010/main" val="1711623893"/>
+        <p14:creationId xmlns:p14="http://schemas.microsoft.com/office/powerpoint/2010/main" val="1142226271"/>
       </p:ext>
     </p:extLst>
   </p:cSld>
@@ -2940,8 +2997,8 @@
         </p:nvSpPr>
         <p:spPr>
           <a:xfrm>
-            <a:off x="8303740" y="0"/>
-            <a:ext cx="3888259" cy="6857999"/>
+            <a:off x="6227806" y="1"/>
+            <a:ext cx="2916194" cy="6857999"/>
           </a:xfrm>
           <a:prstGeom prst="rect">
             <a:avLst/>
@@ -3001,8 +3058,8 @@
         </p:nvSpPr>
         <p:spPr>
           <a:xfrm>
-            <a:off x="8549640" y="685800"/>
-            <a:ext cx="3200400" cy="1737360"/>
+            <a:off x="6412230" y="685800"/>
+            <a:ext cx="2400300" cy="1737360"/>
           </a:xfrm>
         </p:spPr>
         <p:txBody>
@@ -3011,7 +3068,7 @@
           </a:bodyPr>
           <a:lstStyle>
             <a:lvl1pPr>
-              <a:defRPr sz="3200" b="1"/>
+              <a:defRPr sz="2800" b="0"/>
             </a:lvl1pPr>
           </a:lstStyle>
           <a:p>
@@ -3036,7 +3093,7 @@
         <p:spPr>
           <a:xfrm>
             <a:off x="0" y="0"/>
-            <a:ext cx="8303740" cy="6858000"/>
+            <a:ext cx="6227805" cy="6858000"/>
           </a:xfrm>
           <a:solidFill>
             <a:schemeClr val="tx2">
@@ -3106,8 +3163,8 @@
         </p:nvSpPr>
         <p:spPr>
           <a:xfrm>
-            <a:off x="8549640" y="2423160"/>
-            <a:ext cx="3200400" cy="3291840"/>
+            <a:off x="6412230" y="2423160"/>
+            <a:ext cx="2400300" cy="3291840"/>
           </a:xfrm>
         </p:spPr>
         <p:txBody>
@@ -3123,10 +3180,10 @@
                 <a:spcPts val="1000"/>
               </a:spcBef>
               <a:buNone/>
-              <a:defRPr sz="1400">
+              <a:defRPr sz="1350">
                 <a:solidFill>
                   <a:schemeClr val="accent1">
-                    <a:lumMod val="75000"/>
+                    <a:lumMod val="50000"/>
                   </a:schemeClr>
                 </a:solidFill>
               </a:defRPr>
@@ -3173,55 +3230,32 @@
           </a:p>
         </p:txBody>
       </p:sp>
-      <p:sp>
-        <p:nvSpPr>
-          <p:cNvPr id="5" name="Date Placeholder 4"/>
-          <p:cNvSpPr>
-            <a:spLocks noGrp="1"/>
-          </p:cNvSpPr>
-          <p:nvPr>
-            <p:ph type="dt" sz="half" idx="10"/>
-          </p:nvPr>
-        </p:nvSpPr>
-        <p:spPr/>
-        <p:txBody>
-          <a:bodyPr/>
-          <a:lstStyle/>
-          <a:p>
-            <a:fld id="{3772C379-9A7C-4C87-A116-CBE9F58B04C5}" type="datetimeFigureOut">
-              <a:rPr lang="en-US" smtClean="0"/>
-              <a:t>2/1/2018</a:t>
-            </a:fld>
-            <a:endParaRPr lang="en-US" dirty="0"/>
-          </a:p>
-        </p:txBody>
-      </p:sp>
       <p:grpSp>
         <p:nvGrpSpPr>
-          <p:cNvPr id="8" name="Group 7"/>
-          <p:cNvGrpSpPr>
-            <a:grpSpLocks noChangeAspect="1"/>
-          </p:cNvGrpSpPr>
+          <p:cNvPr id="12" name="Group 11"/>
+          <p:cNvGrpSpPr/>
           <p:nvPr/>
         </p:nvGrpSpPr>
         <p:grpSpPr>
           <a:xfrm>
-            <a:off x="11401725" y="6229681"/>
-            <a:ext cx="457200" cy="457200"/>
-            <a:chOff x="11361456" y="6195813"/>
-            <a:chExt cx="548640" cy="548640"/>
+            <a:off x="8522664" y="6255258"/>
+            <a:ext cx="393192" cy="393192"/>
+            <a:chOff x="8532189" y="5068824"/>
+            <a:chExt cx="393192" cy="393192"/>
           </a:xfrm>
         </p:grpSpPr>
         <p:sp>
           <p:nvSpPr>
-            <p:cNvPr id="9" name="Oval 8"/>
-            <p:cNvSpPr/>
+            <p:cNvPr id="13" name="Oval 12"/>
+            <p:cNvSpPr>
+              <a:spLocks noChangeAspect="1"/>
+            </p:cNvSpPr>
             <p:nvPr/>
           </p:nvSpPr>
           <p:spPr>
             <a:xfrm>
-              <a:off x="11361456" y="6195813"/>
-              <a:ext cx="548640" cy="548640"/>
+              <a:off x="8532189" y="5068824"/>
+              <a:ext cx="393192" cy="393192"/>
             </a:xfrm>
             <a:prstGeom prst="ellipse">
               <a:avLst/>
@@ -3262,14 +3296,16 @@
         </p:sp>
         <p:sp>
           <p:nvSpPr>
-            <p:cNvPr id="10" name="Oval 9"/>
-            <p:cNvSpPr/>
+            <p:cNvPr id="14" name="Oval 13"/>
+            <p:cNvSpPr>
+              <a:spLocks noChangeAspect="1"/>
+            </p:cNvSpPr>
             <p:nvPr/>
           </p:nvSpPr>
           <p:spPr>
             <a:xfrm>
-              <a:off x="11396488" y="6230844"/>
-              <a:ext cx="478576" cy="478578"/>
+              <a:off x="8568766" y="5105400"/>
+              <a:ext cx="320039" cy="320040"/>
             </a:xfrm>
             <a:prstGeom prst="ellipse">
               <a:avLst/>
@@ -3277,7 +3313,7 @@
             <a:noFill/>
             <a:ln w="12700" cap="flat" cmpd="sng" algn="ctr">
               <a:solidFill>
-                <a:sysClr val="window" lastClr="FFFFFF"/>
+                <a:srgbClr val="FFFFFF"/>
               </a:solidFill>
               <a:prstDash val="solid"/>
             </a:ln>
@@ -3287,7 +3323,30 @@
       </p:grpSp>
       <p:sp>
         <p:nvSpPr>
-          <p:cNvPr id="7" name="Slide Number Placeholder 6"/>
+          <p:cNvPr id="8" name="Date Placeholder 7"/>
+          <p:cNvSpPr>
+            <a:spLocks noGrp="1"/>
+          </p:cNvSpPr>
+          <p:nvPr>
+            <p:ph type="dt" sz="half" idx="10"/>
+          </p:nvPr>
+        </p:nvSpPr>
+        <p:spPr/>
+        <p:txBody>
+          <a:bodyPr/>
+          <a:lstStyle/>
+          <a:p>
+            <a:fld id="{3772C379-9A7C-4C87-A116-CBE9F58B04C5}" type="datetimeFigureOut">
+              <a:rPr lang="en-US" smtClean="0"/>
+              <a:t>10/7/2017</a:t>
+            </a:fld>
+            <a:endParaRPr lang="en-US" dirty="0"/>
+          </a:p>
+        </p:txBody>
+      </p:sp>
+      <p:sp>
+        <p:nvSpPr>
+          <p:cNvPr id="10" name="Slide Number Placeholder 9"/>
           <p:cNvSpPr>
             <a:spLocks noGrp="1"/>
           </p:cNvSpPr>
@@ -3311,7 +3370,7 @@
     </p:spTree>
     <p:extLst>
       <p:ext uri="{BB962C8B-B14F-4D97-AF65-F5344CB8AC3E}">
-        <p14:creationId xmlns:p14="http://schemas.microsoft.com/office/powerpoint/2010/main" val="2352678023"/>
+        <p14:creationId xmlns:p14="http://schemas.microsoft.com/office/powerpoint/2010/main" val="2158190721"/>
       </p:ext>
     </p:extLst>
   </p:cSld>
@@ -3343,201 +3402,32 @@
           <a:chExt cx="0" cy="0"/>
         </a:xfrm>
       </p:grpSpPr>
-      <p:sp>
-        <p:nvSpPr>
-          <p:cNvPr id="2" name="Title Placeholder 1"/>
-          <p:cNvSpPr>
-            <a:spLocks noGrp="1"/>
-          </p:cNvSpPr>
-          <p:nvPr>
-            <p:ph type="title"/>
-          </p:nvPr>
-        </p:nvSpPr>
-        <p:spPr>
-          <a:xfrm>
-            <a:off x="1069848" y="484632"/>
-            <a:ext cx="10058400" cy="1609344"/>
-          </a:xfrm>
-          <a:prstGeom prst="rect">
-            <a:avLst/>
-          </a:prstGeom>
-        </p:spPr>
-        <p:txBody>
-          <a:bodyPr vert="horz" lIns="91440" tIns="45720" rIns="91440" bIns="45720" rtlCol="0" anchor="ctr">
-            <a:normAutofit/>
-          </a:bodyPr>
-          <a:lstStyle/>
-          <a:p>
-            <a:r>
-              <a:rPr lang="en-US"/>
-              <a:t>Click to edit Master title style</a:t>
-            </a:r>
-            <a:endParaRPr lang="en-US" dirty="0"/>
-          </a:p>
-        </p:txBody>
-      </p:sp>
-      <p:sp>
-        <p:nvSpPr>
-          <p:cNvPr id="3" name="Text Placeholder 2"/>
-          <p:cNvSpPr>
-            <a:spLocks noGrp="1"/>
-          </p:cNvSpPr>
-          <p:nvPr>
-            <p:ph type="body" idx="1"/>
-          </p:nvPr>
-        </p:nvSpPr>
-        <p:spPr>
-          <a:xfrm>
-            <a:off x="1069848" y="2121408"/>
-            <a:ext cx="10058400" cy="4050792"/>
-          </a:xfrm>
-          <a:prstGeom prst="rect">
-            <a:avLst/>
-          </a:prstGeom>
-        </p:spPr>
-        <p:txBody>
-          <a:bodyPr vert="horz" lIns="91440" tIns="45720" rIns="91440" bIns="45720" rtlCol="0">
-            <a:normAutofit/>
-          </a:bodyPr>
-          <a:lstStyle/>
-          <a:p>
-            <a:pPr lvl="0"/>
-            <a:r>
-              <a:rPr lang="en-US"/>
-              <a:t>Edit Master text styles</a:t>
-            </a:r>
-          </a:p>
-          <a:p>
-            <a:pPr lvl="1"/>
-            <a:r>
-              <a:rPr lang="en-US"/>
-              <a:t>Second level</a:t>
-            </a:r>
-          </a:p>
-          <a:p>
-            <a:pPr lvl="2"/>
-            <a:r>
-              <a:rPr lang="en-US"/>
-              <a:t>Third level</a:t>
-            </a:r>
-          </a:p>
-          <a:p>
-            <a:pPr lvl="3"/>
-            <a:r>
-              <a:rPr lang="en-US"/>
-              <a:t>Fourth level</a:t>
-            </a:r>
-          </a:p>
-          <a:p>
-            <a:pPr lvl="4"/>
-            <a:r>
-              <a:rPr lang="en-US"/>
-              <a:t>Fifth level</a:t>
-            </a:r>
-            <a:endParaRPr lang="en-US" dirty="0"/>
-          </a:p>
-        </p:txBody>
-      </p:sp>
-      <p:sp>
-        <p:nvSpPr>
-          <p:cNvPr id="4" name="Date Placeholder 3"/>
-          <p:cNvSpPr>
-            <a:spLocks noGrp="1"/>
-          </p:cNvSpPr>
-          <p:nvPr>
-            <p:ph type="dt" sz="half" idx="2"/>
-          </p:nvPr>
-        </p:nvSpPr>
-        <p:spPr>
-          <a:xfrm>
-            <a:off x="7964424" y="6272784"/>
-            <a:ext cx="3273552" cy="365125"/>
-          </a:xfrm>
-          <a:prstGeom prst="rect">
-            <a:avLst/>
-          </a:prstGeom>
-        </p:spPr>
-        <p:txBody>
-          <a:bodyPr vert="horz" lIns="91440" tIns="45720" rIns="91440" bIns="45720" rtlCol="0" anchor="ctr"/>
-          <a:lstStyle>
-            <a:lvl1pPr algn="r">
-              <a:defRPr sz="1100">
-                <a:solidFill>
-                  <a:schemeClr val="tx2"/>
-                </a:solidFill>
-              </a:defRPr>
-            </a:lvl1pPr>
-          </a:lstStyle>
-          <a:p>
-            <a:fld id="{8664C608-40B1-4030-A28D-5B74BC98ADCE}" type="datetimeFigureOut">
-              <a:rPr lang="en-US" smtClean="0"/>
-              <a:t>2/1/2018</a:t>
-            </a:fld>
-            <a:endParaRPr lang="en-US" dirty="0"/>
-          </a:p>
-        </p:txBody>
-      </p:sp>
-      <p:sp>
-        <p:nvSpPr>
-          <p:cNvPr id="5" name="Footer Placeholder 4"/>
-          <p:cNvSpPr>
-            <a:spLocks noGrp="1"/>
-          </p:cNvSpPr>
-          <p:nvPr>
-            <p:ph type="ftr" sz="quarter" idx="3"/>
-          </p:nvPr>
-        </p:nvSpPr>
-        <p:spPr>
-          <a:xfrm>
-            <a:off x="1088136" y="6272784"/>
-            <a:ext cx="6327648" cy="365125"/>
-          </a:xfrm>
-          <a:prstGeom prst="rect">
-            <a:avLst/>
-          </a:prstGeom>
-        </p:spPr>
-        <p:txBody>
-          <a:bodyPr vert="horz" lIns="91440" tIns="45720" rIns="91440" bIns="45720" rtlCol="0" anchor="ctr"/>
-          <a:lstStyle>
-            <a:lvl1pPr algn="l">
-              <a:defRPr sz="1100">
-                <a:solidFill>
-                  <a:schemeClr val="tx2"/>
-                </a:solidFill>
-              </a:defRPr>
-            </a:lvl1pPr>
-          </a:lstStyle>
-          <a:p>
-            <a:endParaRPr lang="en-US" dirty="0"/>
-          </a:p>
-        </p:txBody>
-      </p:sp>
       <p:grpSp>
         <p:nvGrpSpPr>
-          <p:cNvPr id="7" name="Group 6"/>
-          <p:cNvGrpSpPr>
-            <a:grpSpLocks noChangeAspect="1"/>
-          </p:cNvGrpSpPr>
+          <p:cNvPr id="12" name="Group 11"/>
+          <p:cNvGrpSpPr/>
           <p:nvPr/>
         </p:nvGrpSpPr>
         <p:grpSpPr>
           <a:xfrm>
-            <a:off x="11401725" y="6229681"/>
-            <a:ext cx="457200" cy="457200"/>
-            <a:chOff x="11361456" y="6195813"/>
-            <a:chExt cx="548640" cy="548640"/>
+            <a:off x="8522664" y="6255258"/>
+            <a:ext cx="393192" cy="393192"/>
+            <a:chOff x="8532189" y="5068824"/>
+            <a:chExt cx="393192" cy="393192"/>
           </a:xfrm>
         </p:grpSpPr>
         <p:sp>
           <p:nvSpPr>
             <p:cNvPr id="8" name="Oval 7"/>
-            <p:cNvSpPr/>
+            <p:cNvSpPr>
+              <a:spLocks noChangeAspect="1"/>
+            </p:cNvSpPr>
             <p:nvPr/>
           </p:nvSpPr>
           <p:spPr>
             <a:xfrm>
-              <a:off x="11361456" y="6195813"/>
-              <a:ext cx="548640" cy="548640"/>
+              <a:off x="8532189" y="5068824"/>
+              <a:ext cx="393192" cy="393192"/>
             </a:xfrm>
             <a:prstGeom prst="ellipse">
               <a:avLst/>
@@ -3579,13 +3469,15 @@
         <p:sp>
           <p:nvSpPr>
             <p:cNvPr id="9" name="Oval 8"/>
-            <p:cNvSpPr/>
+            <p:cNvSpPr>
+              <a:spLocks noChangeAspect="1"/>
+            </p:cNvSpPr>
             <p:nvPr/>
           </p:nvSpPr>
           <p:spPr>
             <a:xfrm>
-              <a:off x="11396488" y="6230844"/>
-              <a:ext cx="478576" cy="478578"/>
+              <a:off x="8568766" y="5105400"/>
+              <a:ext cx="320039" cy="320040"/>
             </a:xfrm>
             <a:prstGeom prst="ellipse">
               <a:avLst/>
@@ -3603,32 +3495,205 @@
       </p:grpSp>
       <p:sp>
         <p:nvSpPr>
-          <p:cNvPr id="6" name="Slide Number Placeholder 5"/>
-          <p:cNvSpPr>
-            <a:spLocks noGrp="1"/>
-          </p:cNvSpPr>
-          <p:nvPr>
-            <p:ph type="sldNum" sz="quarter" idx="4"/>
+          <p:cNvPr id="2" name="Title Placeholder 1"/>
+          <p:cNvSpPr>
+            <a:spLocks noGrp="1"/>
+          </p:cNvSpPr>
+          <p:nvPr>
+            <p:ph type="title"/>
           </p:nvPr>
         </p:nvSpPr>
         <p:spPr>
           <a:xfrm>
-            <a:off x="11311128" y="6272784"/>
-            <a:ext cx="640080" cy="365125"/>
+            <a:off x="685800" y="484632"/>
+            <a:ext cx="7772400" cy="1609344"/>
           </a:xfrm>
           <a:prstGeom prst="rect">
             <a:avLst/>
           </a:prstGeom>
         </p:spPr>
         <p:txBody>
+          <a:bodyPr vert="horz" lIns="91440" tIns="45720" rIns="91440" bIns="45720" rtlCol="0" anchor="ctr">
+            <a:normAutofit/>
+          </a:bodyPr>
+          <a:lstStyle/>
+          <a:p>
+            <a:r>
+              <a:rPr lang="en-US"/>
+              <a:t>Click to edit Master title style</a:t>
+            </a:r>
+            <a:endParaRPr lang="en-US" dirty="0"/>
+          </a:p>
+        </p:txBody>
+      </p:sp>
+      <p:sp>
+        <p:nvSpPr>
+          <p:cNvPr id="3" name="Text Placeholder 2"/>
+          <p:cNvSpPr>
+            <a:spLocks noGrp="1"/>
+          </p:cNvSpPr>
+          <p:nvPr>
+            <p:ph type="body" idx="1"/>
+          </p:nvPr>
+        </p:nvSpPr>
+        <p:spPr>
+          <a:xfrm>
+            <a:off x="685800" y="2121408"/>
+            <a:ext cx="7772400" cy="4050792"/>
+          </a:xfrm>
+          <a:prstGeom prst="rect">
+            <a:avLst/>
+          </a:prstGeom>
+        </p:spPr>
+        <p:txBody>
+          <a:bodyPr vert="horz" lIns="91440" tIns="45720" rIns="91440" bIns="45720" rtlCol="0">
+            <a:normAutofit/>
+          </a:bodyPr>
+          <a:lstStyle/>
+          <a:p>
+            <a:pPr lvl="0"/>
+            <a:r>
+              <a:rPr lang="en-US"/>
+              <a:t>Edit Master text styles</a:t>
+            </a:r>
+          </a:p>
+          <a:p>
+            <a:pPr lvl="1"/>
+            <a:r>
+              <a:rPr lang="en-US"/>
+              <a:t>Second level</a:t>
+            </a:r>
+          </a:p>
+          <a:p>
+            <a:pPr lvl="2"/>
+            <a:r>
+              <a:rPr lang="en-US"/>
+              <a:t>Third level</a:t>
+            </a:r>
+          </a:p>
+          <a:p>
+            <a:pPr lvl="3"/>
+            <a:r>
+              <a:rPr lang="en-US"/>
+              <a:t>Fourth level</a:t>
+            </a:r>
+          </a:p>
+          <a:p>
+            <a:pPr lvl="4"/>
+            <a:r>
+              <a:rPr lang="en-US"/>
+              <a:t>Fifth level</a:t>
+            </a:r>
+            <a:endParaRPr lang="en-US" dirty="0"/>
+          </a:p>
+        </p:txBody>
+      </p:sp>
+      <p:sp>
+        <p:nvSpPr>
+          <p:cNvPr id="4" name="Date Placeholder 3"/>
+          <p:cNvSpPr>
+            <a:spLocks noGrp="1"/>
+          </p:cNvSpPr>
+          <p:nvPr>
+            <p:ph type="dt" sz="half" idx="2"/>
+          </p:nvPr>
+        </p:nvSpPr>
+        <p:spPr>
+          <a:xfrm>
+            <a:off x="5992368" y="6272785"/>
+            <a:ext cx="2455164" cy="365125"/>
+          </a:xfrm>
+          <a:prstGeom prst="rect">
+            <a:avLst/>
+          </a:prstGeom>
+        </p:spPr>
+        <p:txBody>
+          <a:bodyPr vert="horz" lIns="91440" tIns="45720" rIns="91440" bIns="45720" rtlCol="0" anchor="ctr"/>
+          <a:lstStyle>
+            <a:lvl1pPr algn="r">
+              <a:defRPr sz="1000">
+                <a:solidFill>
+                  <a:schemeClr val="accent1">
+                    <a:lumMod val="50000"/>
+                  </a:schemeClr>
+                </a:solidFill>
+              </a:defRPr>
+            </a:lvl1pPr>
+          </a:lstStyle>
+          <a:p>
+            <a:fld id="{8664C608-40B1-4030-A28D-5B74BC98ADCE}" type="datetimeFigureOut">
+              <a:rPr lang="en-US" smtClean="0"/>
+              <a:t>10/7/2017</a:t>
+            </a:fld>
+            <a:endParaRPr lang="en-US" dirty="0"/>
+          </a:p>
+        </p:txBody>
+      </p:sp>
+      <p:sp>
+        <p:nvSpPr>
+          <p:cNvPr id="5" name="Footer Placeholder 4"/>
+          <p:cNvSpPr>
+            <a:spLocks noGrp="1"/>
+          </p:cNvSpPr>
+          <p:nvPr>
+            <p:ph type="ftr" sz="quarter" idx="3"/>
+          </p:nvPr>
+        </p:nvSpPr>
+        <p:spPr>
+          <a:xfrm>
+            <a:off x="685800" y="6272785"/>
+            <a:ext cx="4745736" cy="365125"/>
+          </a:xfrm>
+          <a:prstGeom prst="rect">
+            <a:avLst/>
+          </a:prstGeom>
+        </p:spPr>
+        <p:txBody>
+          <a:bodyPr vert="horz" lIns="91440" tIns="45720" rIns="91440" bIns="45720" rtlCol="0" anchor="ctr"/>
+          <a:lstStyle>
+            <a:lvl1pPr algn="l">
+              <a:defRPr sz="1000">
+                <a:solidFill>
+                  <a:schemeClr val="accent1">
+                    <a:lumMod val="50000"/>
+                  </a:schemeClr>
+                </a:solidFill>
+              </a:defRPr>
+            </a:lvl1pPr>
+          </a:lstStyle>
+          <a:p>
+            <a:endParaRPr lang="en-US" dirty="0"/>
+          </a:p>
+        </p:txBody>
+      </p:sp>
+      <p:sp>
+        <p:nvSpPr>
+          <p:cNvPr id="6" name="Slide Number Placeholder 5"/>
+          <p:cNvSpPr>
+            <a:spLocks noGrp="1"/>
+          </p:cNvSpPr>
+          <p:nvPr>
+            <p:ph type="sldNum" sz="quarter" idx="4"/>
+          </p:nvPr>
+        </p:nvSpPr>
+        <p:spPr>
+          <a:xfrm>
+            <a:off x="8483346" y="6272785"/>
+            <a:ext cx="480060" cy="365125"/>
+          </a:xfrm>
+          <a:prstGeom prst="rect">
+            <a:avLst/>
+          </a:prstGeom>
+        </p:spPr>
+        <p:txBody>
           <a:bodyPr vert="horz" lIns="91440" tIns="45720" rIns="91440" bIns="45720" rtlCol="0" anchor="ctr"/>
           <a:lstStyle>
             <a:lvl1pPr algn="ctr">
-              <a:defRPr sz="1400" b="1">
+              <a:defRPr sz="1100" b="1" spc="-70" baseline="0">
                 <a:solidFill>
                   <a:srgbClr val="FFFFFF"/>
                 </a:solidFill>
-                <a:latin typeface="+mj-lt"/>
+                <a:latin typeface="+mn-lt"/>
               </a:defRPr>
             </a:lvl1pPr>
           </a:lstStyle>
@@ -3645,23 +3710,23 @@
     </p:spTree>
     <p:extLst>
       <p:ext uri="{BB962C8B-B14F-4D97-AF65-F5344CB8AC3E}">
-        <p14:creationId xmlns:p14="http://schemas.microsoft.com/office/powerpoint/2010/main" val="2147907148"/>
+        <p14:creationId xmlns:p14="http://schemas.microsoft.com/office/powerpoint/2010/main" val="4038872160"/>
       </p:ext>
     </p:extLst>
   </p:cSld>
   <p:clrMap bg1="lt1" tx1="dk1" bg2="lt2" tx2="dk2" accent1="accent1" accent2="accent2" accent3="accent3" accent4="accent4" accent5="accent5" accent6="accent6" hlink="hlink" folHlink="folHlink"/>
   <p:sldLayoutIdLst>
-    <p:sldLayoutId id="2147483865" r:id="rId1"/>
-    <p:sldLayoutId id="2147483866" r:id="rId2"/>
-    <p:sldLayoutId id="2147483867" r:id="rId3"/>
-    <p:sldLayoutId id="2147483868" r:id="rId4"/>
-    <p:sldLayoutId id="2147483869" r:id="rId5"/>
-    <p:sldLayoutId id="2147483870" r:id="rId6"/>
-    <p:sldLayoutId id="2147483871" r:id="rId7"/>
-    <p:sldLayoutId id="2147483872" r:id="rId8"/>
-    <p:sldLayoutId id="2147483873" r:id="rId9"/>
-    <p:sldLayoutId id="2147483874" r:id="rId10"/>
-    <p:sldLayoutId id="2147483875" r:id="rId11"/>
+    <p:sldLayoutId id="2147483853" r:id="rId1"/>
+    <p:sldLayoutId id="2147483854" r:id="rId2"/>
+    <p:sldLayoutId id="2147483855" r:id="rId3"/>
+    <p:sldLayoutId id="2147483856" r:id="rId4"/>
+    <p:sldLayoutId id="2147483857" r:id="rId5"/>
+    <p:sldLayoutId id="2147483858" r:id="rId6"/>
+    <p:sldLayoutId id="2147483859" r:id="rId7"/>
+    <p:sldLayoutId id="2147483860" r:id="rId8"/>
+    <p:sldLayoutId id="2147483861" r:id="rId9"/>
+    <p:sldLayoutId id="2147483862" r:id="rId10"/>
+    <p:sldLayoutId id="2147483863" r:id="rId11"/>
   </p:sldLayoutIdLst>
   <p:hf sldNum="0" hdr="0" ftr="0" dt="0"/>
   <p:txStyles>
@@ -3674,7 +3739,7 @@
           <a:spcPct val="0"/>
         </a:spcBef>
         <a:buNone/>
-        <a:defRPr sz="5400" kern="1200" cap="all" baseline="0">
+        <a:defRPr sz="4200" b="0" kern="1200" cap="all" baseline="0">
           <a:blipFill>
             <a:blip r:embed="rId15">
               <a:extLst>
@@ -4087,14 +4152,12 @@
         </p:nvSpPr>
         <p:spPr>
           <a:xfrm>
-            <a:off x="2326386" y="5099901"/>
+            <a:off x="802386" y="5099900"/>
             <a:ext cx="5918454" cy="359067"/>
           </a:xfrm>
         </p:spPr>
         <p:txBody>
-          <a:bodyPr>
-            <a:normAutofit fontScale="92500" lnSpcReduction="10000"/>
-          </a:bodyPr>
+          <a:bodyPr/>
           <a:lstStyle/>
           <a:p>
             <a:r>
@@ -4229,7 +4292,7 @@
         </p:nvSpPr>
         <p:spPr>
           <a:xfrm>
-            <a:off x="4245990" y="2356113"/>
+            <a:off x="2721990" y="2356113"/>
             <a:ext cx="961534" cy="431276"/>
           </a:xfrm>
           <a:prstGeom prst="rect">
@@ -4272,7 +4335,7 @@
         </p:nvSpPr>
         <p:spPr>
           <a:xfrm>
-            <a:off x="5644068" y="2356113"/>
+            <a:off x="4120068" y="2356113"/>
             <a:ext cx="961534" cy="431276"/>
           </a:xfrm>
           <a:prstGeom prst="rect">
@@ -4315,7 +4378,7 @@
         </p:nvSpPr>
         <p:spPr>
           <a:xfrm>
-            <a:off x="7042145" y="2356112"/>
+            <a:off x="5518145" y="2356112"/>
             <a:ext cx="961534" cy="431276"/>
           </a:xfrm>
           <a:prstGeom prst="rect">
@@ -4358,7 +4421,7 @@
         </p:nvSpPr>
         <p:spPr>
           <a:xfrm>
-            <a:off x="8539900" y="2356112"/>
+            <a:off x="7015900" y="2356112"/>
             <a:ext cx="961534" cy="431276"/>
           </a:xfrm>
           <a:prstGeom prst="rect">
@@ -4404,7 +4467,7 @@
         </p:nvCxnSpPr>
         <p:spPr>
           <a:xfrm flipH="1">
-            <a:off x="4726756" y="2787389"/>
+            <a:off x="3202756" y="2787389"/>
             <a:ext cx="2" cy="1824086"/>
           </a:xfrm>
           <a:prstGeom prst="line">
@@ -4436,7 +4499,7 @@
         </p:nvCxnSpPr>
         <p:spPr>
           <a:xfrm flipH="1">
-            <a:off x="6116863" y="2787389"/>
+            <a:off x="4592863" y="2787389"/>
             <a:ext cx="7972" cy="1824086"/>
           </a:xfrm>
           <a:prstGeom prst="line">
@@ -4468,7 +4531,7 @@
         </p:nvCxnSpPr>
         <p:spPr>
           <a:xfrm flipH="1">
-            <a:off x="7522910" y="2787389"/>
+            <a:off x="5998910" y="2787388"/>
             <a:ext cx="2" cy="1824087"/>
           </a:xfrm>
           <a:prstGeom prst="line">
@@ -4500,7 +4563,7 @@
         </p:nvCxnSpPr>
         <p:spPr>
           <a:xfrm>
-            <a:off x="9020667" y="2787389"/>
+            <a:off x="7496667" y="2787388"/>
             <a:ext cx="7970" cy="1753387"/>
           </a:xfrm>
           <a:prstGeom prst="line">
@@ -4530,7 +4593,7 @@
         </p:nvCxnSpPr>
         <p:spPr>
           <a:xfrm flipV="1">
-            <a:off x="7522911" y="3586310"/>
+            <a:off x="5998911" y="3586309"/>
             <a:ext cx="1497756" cy="14141"/>
           </a:xfrm>
           <a:prstGeom prst="straightConnector1">
@@ -4563,7 +4626,7 @@
         </p:nvSpPr>
         <p:spPr>
           <a:xfrm>
-            <a:off x="7915373" y="3586309"/>
+            <a:off x="6391373" y="3586309"/>
             <a:ext cx="886120" cy="300082"/>
           </a:xfrm>
           <a:prstGeom prst="rect">
@@ -4592,7 +4655,7 @@
         </p:nvCxnSpPr>
         <p:spPr>
           <a:xfrm flipV="1">
-            <a:off x="4726757" y="3071114"/>
+            <a:off x="3202756" y="3071113"/>
             <a:ext cx="2796155" cy="13223"/>
           </a:xfrm>
           <a:prstGeom prst="straightConnector1">
@@ -4625,7 +4688,7 @@
         </p:nvSpPr>
         <p:spPr>
           <a:xfrm>
-            <a:off x="5194212" y="3142102"/>
+            <a:off x="3670212" y="3142102"/>
             <a:ext cx="494046" cy="300082"/>
           </a:xfrm>
           <a:prstGeom prst="rect">
@@ -4654,7 +4717,7 @@
         </p:nvCxnSpPr>
         <p:spPr>
           <a:xfrm>
-            <a:off x="6132805" y="3337161"/>
+            <a:off x="4608805" y="3337161"/>
             <a:ext cx="1390106" cy="0"/>
           </a:xfrm>
           <a:prstGeom prst="straightConnector1">
@@ -4687,7 +4750,7 @@
         </p:nvSpPr>
         <p:spPr>
           <a:xfrm>
-            <a:off x="6532751" y="3365240"/>
+            <a:off x="5008751" y="3365240"/>
             <a:ext cx="494046" cy="300082"/>
           </a:xfrm>
           <a:prstGeom prst="rect">
@@ -4750,13 +4813,13 @@
         </p:nvSpPr>
         <p:spPr>
           <a:xfrm>
-            <a:off x="1069847" y="0"/>
-            <a:ext cx="10217277" cy="1163669"/>
+            <a:off x="802386" y="1220724"/>
+            <a:ext cx="8341614" cy="1163669"/>
           </a:xfrm>
         </p:spPr>
         <p:txBody>
           <a:bodyPr>
-            <a:normAutofit fontScale="90000"/>
+            <a:normAutofit/>
           </a:bodyPr>
           <a:lstStyle/>
           <a:p>
@@ -4777,12 +4840,7 @@
             <p:ph idx="1"/>
           </p:nvPr>
         </p:nvSpPr>
-        <p:spPr>
-          <a:xfrm>
-            <a:off x="910971" y="1466850"/>
-            <a:ext cx="10217277" cy="4705350"/>
-          </a:xfrm>
-        </p:spPr>
+        <p:spPr/>
         <p:txBody>
           <a:bodyPr/>
           <a:lstStyle/>
@@ -4860,7 +4918,7 @@
         </p:nvSpPr>
         <p:spPr>
           <a:xfrm>
-            <a:off x="3482421" y="2476306"/>
+            <a:off x="1958420" y="2476306"/>
             <a:ext cx="1042765" cy="431276"/>
           </a:xfrm>
           <a:prstGeom prst="rect">
@@ -4903,7 +4961,7 @@
         </p:nvSpPr>
         <p:spPr>
           <a:xfrm>
-            <a:off x="4880498" y="2476306"/>
+            <a:off x="3356498" y="2476306"/>
             <a:ext cx="961534" cy="431276"/>
           </a:xfrm>
           <a:prstGeom prst="rect">
@@ -4946,7 +5004,7 @@
         </p:nvSpPr>
         <p:spPr>
           <a:xfrm>
-            <a:off x="6278575" y="2476306"/>
+            <a:off x="4754575" y="2476306"/>
             <a:ext cx="961534" cy="431276"/>
           </a:xfrm>
           <a:prstGeom prst="rect">
@@ -4989,7 +5047,7 @@
         </p:nvSpPr>
         <p:spPr>
           <a:xfrm>
-            <a:off x="7587449" y="2476305"/>
+            <a:off x="6063449" y="2476305"/>
             <a:ext cx="1077534" cy="431276"/>
           </a:xfrm>
           <a:prstGeom prst="rect">
@@ -5034,7 +5092,7 @@
         </p:nvCxnSpPr>
         <p:spPr>
           <a:xfrm>
-            <a:off x="8126217" y="2907582"/>
+            <a:off x="6602216" y="2907581"/>
             <a:ext cx="55117" cy="1753387"/>
           </a:xfrm>
           <a:prstGeom prst="line">
@@ -5064,7 +5122,7 @@
         </p:nvCxnSpPr>
         <p:spPr>
           <a:xfrm>
-            <a:off x="6759343" y="3720644"/>
+            <a:off x="5235342" y="3720643"/>
             <a:ext cx="1414021" cy="14141"/>
           </a:xfrm>
           <a:prstGeom prst="straightConnector1">
@@ -5097,7 +5155,7 @@
         </p:nvSpPr>
         <p:spPr>
           <a:xfrm>
-            <a:off x="7106681" y="3706503"/>
+            <a:off x="5582681" y="3706503"/>
             <a:ext cx="776332" cy="300082"/>
           </a:xfrm>
           <a:prstGeom prst="rect">
@@ -5126,7 +5184,7 @@
         </p:nvCxnSpPr>
         <p:spPr>
           <a:xfrm flipV="1">
-            <a:off x="3963188" y="3191308"/>
+            <a:off x="2439187" y="3191307"/>
             <a:ext cx="2796155" cy="13223"/>
           </a:xfrm>
           <a:prstGeom prst="straightConnector1">
@@ -5159,7 +5217,7 @@
         </p:nvSpPr>
         <p:spPr>
           <a:xfrm>
-            <a:off x="4430642" y="3262295"/>
+            <a:off x="2906642" y="3262295"/>
             <a:ext cx="494046" cy="300082"/>
           </a:xfrm>
           <a:prstGeom prst="rect">
@@ -5188,7 +5246,7 @@
         </p:nvCxnSpPr>
         <p:spPr>
           <a:xfrm>
-            <a:off x="5369236" y="3457355"/>
+            <a:off x="3845236" y="3457355"/>
             <a:ext cx="1390106" cy="0"/>
           </a:xfrm>
           <a:prstGeom prst="straightConnector1">
@@ -5221,7 +5279,7 @@
         </p:nvSpPr>
         <p:spPr>
           <a:xfrm>
-            <a:off x="5769181" y="3485434"/>
+            <a:off x="4245181" y="3485434"/>
             <a:ext cx="494046" cy="300082"/>
           </a:xfrm>
           <a:prstGeom prst="rect">
@@ -5250,7 +5308,7 @@
         </p:nvCxnSpPr>
         <p:spPr>
           <a:xfrm flipH="1">
-            <a:off x="3963186" y="2907583"/>
+            <a:off x="2439186" y="2907583"/>
             <a:ext cx="2" cy="1824086"/>
           </a:xfrm>
           <a:prstGeom prst="line">
@@ -5280,7 +5338,7 @@
         </p:nvCxnSpPr>
         <p:spPr>
           <a:xfrm flipH="1">
-            <a:off x="5353293" y="2907583"/>
+            <a:off x="3829293" y="2907583"/>
             <a:ext cx="7972" cy="1824086"/>
           </a:xfrm>
           <a:prstGeom prst="line">
@@ -5310,7 +5368,7 @@
         </p:nvCxnSpPr>
         <p:spPr>
           <a:xfrm flipH="1">
-            <a:off x="6759340" y="2907582"/>
+            <a:off x="5235340" y="2907581"/>
             <a:ext cx="2" cy="1824087"/>
           </a:xfrm>
           <a:prstGeom prst="line">
@@ -5340,7 +5398,7 @@
         </p:nvSpPr>
         <p:spPr>
           <a:xfrm>
-            <a:off x="9053827" y="2476305"/>
+            <a:off x="7529827" y="2476305"/>
             <a:ext cx="961534" cy="431276"/>
           </a:xfrm>
           <a:prstGeom prst="rect">
@@ -5383,7 +5441,7 @@
         </p:nvCxnSpPr>
         <p:spPr>
           <a:xfrm>
-            <a:off x="9577016" y="2907582"/>
+            <a:off x="8053016" y="2907581"/>
             <a:ext cx="7970" cy="1753387"/>
           </a:xfrm>
           <a:prstGeom prst="line">
@@ -5413,7 +5471,7 @@
         </p:nvCxnSpPr>
         <p:spPr>
           <a:xfrm>
-            <a:off x="8181336" y="3842014"/>
+            <a:off x="6657335" y="3842013"/>
             <a:ext cx="1414021" cy="14141"/>
           </a:xfrm>
           <a:prstGeom prst="straightConnector1">
@@ -5446,7 +5504,7 @@
         </p:nvSpPr>
         <p:spPr>
           <a:xfrm>
-            <a:off x="8573797" y="3827872"/>
+            <a:off x="7049797" y="3827872"/>
             <a:ext cx="731210" cy="300082"/>
           </a:xfrm>
           <a:prstGeom prst="rect">
@@ -5475,7 +5533,7 @@
         </p:nvCxnSpPr>
         <p:spPr>
           <a:xfrm flipH="1">
-            <a:off x="8181334" y="4114251"/>
+            <a:off x="6657333" y="4114251"/>
             <a:ext cx="1395683" cy="0"/>
           </a:xfrm>
           <a:prstGeom prst="straightConnector1">
@@ -5508,7 +5566,7 @@
         </p:nvSpPr>
         <p:spPr>
           <a:xfrm>
-            <a:off x="8152143" y="4120060"/>
+            <a:off x="6628142" y="4120060"/>
             <a:ext cx="1480983" cy="300082"/>
           </a:xfrm>
           <a:prstGeom prst="rect">
@@ -5569,12 +5627,7 @@
             <p:ph type="title"/>
           </p:nvPr>
         </p:nvSpPr>
-        <p:spPr>
-          <a:xfrm>
-            <a:off x="984123" y="0"/>
-            <a:ext cx="10058400" cy="1609344"/>
-          </a:xfrm>
-        </p:spPr>
+        <p:spPr/>
         <p:txBody>
           <a:bodyPr/>
           <a:lstStyle/>
@@ -5596,12 +5649,7 @@
             <p:ph idx="1"/>
           </p:nvPr>
         </p:nvSpPr>
-        <p:spPr>
-          <a:xfrm>
-            <a:off x="984123" y="1457325"/>
-            <a:ext cx="10144125" cy="4714875"/>
-          </a:xfrm>
-        </p:spPr>
+        <p:spPr/>
         <p:txBody>
           <a:bodyPr/>
           <a:lstStyle/>
@@ -5702,12 +5750,7 @@
             <p:ph type="title"/>
           </p:nvPr>
         </p:nvSpPr>
-        <p:spPr>
-          <a:xfrm>
-            <a:off x="1072896" y="0"/>
-            <a:ext cx="10058400" cy="1609344"/>
-          </a:xfrm>
-        </p:spPr>
+        <p:spPr/>
         <p:txBody>
           <a:bodyPr/>
           <a:lstStyle/>
@@ -5729,15 +5772,10 @@
             <p:ph idx="1"/>
           </p:nvPr>
         </p:nvSpPr>
-        <p:spPr>
-          <a:xfrm>
-            <a:off x="1069848" y="1438275"/>
-            <a:ext cx="10058400" cy="4733925"/>
-          </a:xfrm>
-        </p:spPr>
+        <p:spPr/>
         <p:txBody>
           <a:bodyPr>
-            <a:normAutofit/>
+            <a:normAutofit fontScale="92500" lnSpcReduction="20000"/>
           </a:bodyPr>
           <a:lstStyle/>
           <a:p>
@@ -5941,42 +5979,37 @@
             <p:ph type="title"/>
           </p:nvPr>
         </p:nvSpPr>
+        <p:spPr/>
+        <p:txBody>
+          <a:bodyPr/>
+          <a:lstStyle/>
+          <a:p>
+            <a:r>
+              <a:rPr lang="en-US" dirty="0"/>
+              <a:t>Quick practice</a:t>
+            </a:r>
+          </a:p>
+        </p:txBody>
+      </p:sp>
+      <p:sp>
+        <p:nvSpPr>
+          <p:cNvPr id="3" name="Content Placeholder 2"/>
+          <p:cNvSpPr>
+            <a:spLocks noGrp="1"/>
+          </p:cNvSpPr>
+          <p:nvPr>
+            <p:ph idx="1"/>
+          </p:nvPr>
+        </p:nvSpPr>
         <p:spPr>
           <a:xfrm>
-            <a:off x="1222248" y="0"/>
-            <a:ext cx="10058400" cy="1609344"/>
+            <a:off x="802386" y="2271271"/>
+            <a:ext cx="7543800" cy="3215129"/>
           </a:xfrm>
         </p:spPr>
         <p:txBody>
-          <a:bodyPr/>
-          <a:lstStyle/>
-          <a:p>
-            <a:r>
-              <a:rPr lang="en-US" dirty="0"/>
-              <a:t>Quick practice</a:t>
-            </a:r>
-          </a:p>
-        </p:txBody>
-      </p:sp>
-      <p:sp>
-        <p:nvSpPr>
-          <p:cNvPr id="3" name="Content Placeholder 2"/>
-          <p:cNvSpPr>
-            <a:spLocks noGrp="1"/>
-          </p:cNvSpPr>
-          <p:nvPr>
-            <p:ph idx="1"/>
-          </p:nvPr>
-        </p:nvSpPr>
-        <p:spPr>
-          <a:xfrm>
-            <a:off x="1222248" y="1390650"/>
-            <a:ext cx="9464802" cy="5143500"/>
-          </a:xfrm>
-        </p:spPr>
-        <p:txBody>
           <a:bodyPr>
-            <a:normAutofit/>
+            <a:normAutofit fontScale="92500" lnSpcReduction="20000"/>
           </a:bodyPr>
           <a:lstStyle/>
           <a:p>
@@ -6120,42 +6153,37 @@
             <p:ph type="title"/>
           </p:nvPr>
         </p:nvSpPr>
+        <p:spPr/>
+        <p:txBody>
+          <a:bodyPr/>
+          <a:lstStyle/>
+          <a:p>
+            <a:r>
+              <a:rPr lang="en-US" dirty="0"/>
+              <a:t>Quick practice - continued</a:t>
+            </a:r>
+          </a:p>
+        </p:txBody>
+      </p:sp>
+      <p:sp>
+        <p:nvSpPr>
+          <p:cNvPr id="3" name="Content Placeholder 2"/>
+          <p:cNvSpPr>
+            <a:spLocks noGrp="1"/>
+          </p:cNvSpPr>
+          <p:nvPr>
+            <p:ph idx="1"/>
+          </p:nvPr>
+        </p:nvSpPr>
         <p:spPr>
           <a:xfrm>
-            <a:off x="1288923" y="0"/>
-            <a:ext cx="10058400" cy="1609344"/>
+            <a:off x="802386" y="2271271"/>
+            <a:ext cx="7543800" cy="3215129"/>
           </a:xfrm>
         </p:spPr>
         <p:txBody>
-          <a:bodyPr/>
-          <a:lstStyle/>
-          <a:p>
-            <a:r>
-              <a:rPr lang="en-US" dirty="0"/>
-              <a:t>Quick practice - continued</a:t>
-            </a:r>
-          </a:p>
-        </p:txBody>
-      </p:sp>
-      <p:sp>
-        <p:nvSpPr>
-          <p:cNvPr id="3" name="Content Placeholder 2"/>
-          <p:cNvSpPr>
-            <a:spLocks noGrp="1"/>
-          </p:cNvSpPr>
-          <p:nvPr>
-            <p:ph idx="1"/>
-          </p:nvPr>
-        </p:nvSpPr>
-        <p:spPr>
-          <a:xfrm>
-            <a:off x="1288923" y="1457326"/>
-            <a:ext cx="9398127" cy="5114924"/>
-          </a:xfrm>
-        </p:spPr>
-        <p:txBody>
           <a:bodyPr>
-            <a:normAutofit/>
+            <a:normAutofit fontScale="77500" lnSpcReduction="20000"/>
           </a:bodyPr>
           <a:lstStyle/>
           <a:p>
@@ -6348,12 +6376,7 @@
             <p:ph type="title"/>
           </p:nvPr>
         </p:nvSpPr>
-        <p:spPr>
-          <a:xfrm>
-            <a:off x="1066800" y="0"/>
-            <a:ext cx="10058400" cy="1609344"/>
-          </a:xfrm>
-        </p:spPr>
+        <p:spPr/>
         <p:txBody>
           <a:bodyPr/>
           <a:lstStyle/>
@@ -6472,12 +6495,7 @@
             <p:ph type="title"/>
           </p:nvPr>
         </p:nvSpPr>
-        <p:spPr>
-          <a:xfrm>
-            <a:off x="1179921" y="0"/>
-            <a:ext cx="10058400" cy="1609344"/>
-          </a:xfrm>
-        </p:spPr>
+        <p:spPr/>
         <p:txBody>
           <a:bodyPr/>
           <a:lstStyle/>
@@ -6510,7 +6528,7 @@
           </p:nvPr>
         </p:nvGraphicFramePr>
         <p:xfrm>
-          <a:off x="2674070" y="2093976"/>
+          <a:off x="1150069" y="2093976"/>
           <a:ext cx="7070103" cy="3723592"/>
         </p:xfrm>
         <a:graphic>
@@ -7009,12 +7027,7 @@
             <p:ph type="title"/>
           </p:nvPr>
         </p:nvSpPr>
-        <p:spPr>
-          <a:xfrm>
-            <a:off x="1069848" y="0"/>
-            <a:ext cx="10058400" cy="1609344"/>
-          </a:xfrm>
-        </p:spPr>
+        <p:spPr/>
         <p:txBody>
           <a:bodyPr/>
           <a:lstStyle/>
@@ -7115,12 +7128,7 @@
             <p:ph type="title"/>
           </p:nvPr>
         </p:nvSpPr>
-        <p:spPr>
-          <a:xfrm>
-            <a:off x="1066800" y="0"/>
-            <a:ext cx="10058400" cy="1609344"/>
-          </a:xfrm>
-        </p:spPr>
+        <p:spPr/>
         <p:txBody>
           <a:bodyPr/>
           <a:lstStyle/>
@@ -7542,7 +7550,7 @@
         </p:nvSpPr>
         <p:spPr bwMode="auto">
           <a:xfrm>
-            <a:off x="5456635" y="2789635"/>
+            <a:off x="3932635" y="2789635"/>
             <a:ext cx="3095048" cy="3095048"/>
           </a:xfrm>
           <a:prstGeom prst="rect">
@@ -7581,7 +7589,7 @@
         </p:nvSpPr>
         <p:spPr bwMode="auto">
           <a:xfrm>
-            <a:off x="5981700" y="3314700"/>
+            <a:off x="4457700" y="3314700"/>
             <a:ext cx="228600" cy="228600"/>
           </a:xfrm>
           <a:prstGeom prst="rect">
@@ -7626,7 +7634,7 @@
         </p:blipFill>
         <p:spPr>
           <a:xfrm>
-            <a:off x="5605364" y="2259635"/>
+            <a:off x="4081364" y="2259635"/>
             <a:ext cx="2500902" cy="2500902"/>
           </a:xfrm>
           <a:prstGeom prst="rect">
@@ -8057,7 +8065,7 @@
         </p:blipFill>
         <p:spPr bwMode="auto">
           <a:xfrm>
-            <a:off x="3953171" y="2427732"/>
+            <a:off x="2429170" y="2427732"/>
             <a:ext cx="3571875" cy="2800350"/>
           </a:xfrm>
           <a:prstGeom prst="rect">
@@ -8098,7 +8106,7 @@
         </p:nvSpPr>
         <p:spPr bwMode="auto">
           <a:xfrm>
-            <a:off x="7353302" y="5257800"/>
+            <a:off x="5829301" y="5257800"/>
             <a:ext cx="1617751" cy="300082"/>
           </a:xfrm>
           <a:prstGeom prst="rect">
@@ -8397,7 +8405,7 @@
         </p:blipFill>
         <p:spPr bwMode="auto">
           <a:xfrm>
-            <a:off x="4231262" y="2240636"/>
+            <a:off x="2707261" y="2240635"/>
             <a:ext cx="3064669" cy="3450431"/>
           </a:xfrm>
           <a:prstGeom prst="rect">
@@ -8551,7 +8559,7 @@
         </p:blipFill>
         <p:spPr>
           <a:xfrm>
-            <a:off x="4649913" y="1715915"/>
+            <a:off x="3125912" y="1715914"/>
             <a:ext cx="4773749" cy="4883545"/>
           </a:xfrm>
           <a:prstGeom prst="rect">

</xml_diff>